<commit_message>
update suport curs OOP
</commit_message>
<xml_diff>
--- a/suportdecurs/QA Automation - OOP.pptx
+++ b/suportdecurs/QA Automation - OOP.pptx
@@ -15,6 +15,11 @@
     <p:sldId id="262" r:id="rId9"/>
     <p:sldId id="264" r:id="rId10"/>
     <p:sldId id="265" r:id="rId11"/>
+    <p:sldId id="269" r:id="rId12"/>
+    <p:sldId id="267" r:id="rId13"/>
+    <p:sldId id="268" r:id="rId14"/>
+    <p:sldId id="271" r:id="rId15"/>
+    <p:sldId id="270" r:id="rId16"/>
   </p:sldIdLst>
   <p:sldSz cx="12192000" cy="6858000"/>
   <p:notesSz cx="6858000" cy="9144000"/>
@@ -270,7 +275,7 @@
           <a:p>
             <a:fld id="{D098051C-B3F8-164A-B288-2D47518C9AA1}" type="datetimeFigureOut">
               <a:rPr lang="en-RO" smtClean="0"/>
-              <a:t>26.03.2024</a:t>
+              <a:t>27.03.2024</a:t>
             </a:fld>
             <a:endParaRPr lang="en-RO"/>
           </a:p>
@@ -470,7 +475,7 @@
           <a:p>
             <a:fld id="{D098051C-B3F8-164A-B288-2D47518C9AA1}" type="datetimeFigureOut">
               <a:rPr lang="en-RO" smtClean="0"/>
-              <a:t>26.03.2024</a:t>
+              <a:t>27.03.2024</a:t>
             </a:fld>
             <a:endParaRPr lang="en-RO"/>
           </a:p>
@@ -680,7 +685,7 @@
           <a:p>
             <a:fld id="{D098051C-B3F8-164A-B288-2D47518C9AA1}" type="datetimeFigureOut">
               <a:rPr lang="en-RO" smtClean="0"/>
-              <a:t>26.03.2024</a:t>
+              <a:t>27.03.2024</a:t>
             </a:fld>
             <a:endParaRPr lang="en-RO"/>
           </a:p>
@@ -880,7 +885,7 @@
           <a:p>
             <a:fld id="{D098051C-B3F8-164A-B288-2D47518C9AA1}" type="datetimeFigureOut">
               <a:rPr lang="en-RO" smtClean="0"/>
-              <a:t>26.03.2024</a:t>
+              <a:t>27.03.2024</a:t>
             </a:fld>
             <a:endParaRPr lang="en-RO"/>
           </a:p>
@@ -1156,7 +1161,7 @@
           <a:p>
             <a:fld id="{D098051C-B3F8-164A-B288-2D47518C9AA1}" type="datetimeFigureOut">
               <a:rPr lang="en-RO" smtClean="0"/>
-              <a:t>26.03.2024</a:t>
+              <a:t>27.03.2024</a:t>
             </a:fld>
             <a:endParaRPr lang="en-RO"/>
           </a:p>
@@ -1424,7 +1429,7 @@
           <a:p>
             <a:fld id="{D098051C-B3F8-164A-B288-2D47518C9AA1}" type="datetimeFigureOut">
               <a:rPr lang="en-RO" smtClean="0"/>
-              <a:t>26.03.2024</a:t>
+              <a:t>27.03.2024</a:t>
             </a:fld>
             <a:endParaRPr lang="en-RO"/>
           </a:p>
@@ -1839,7 +1844,7 @@
           <a:p>
             <a:fld id="{D098051C-B3F8-164A-B288-2D47518C9AA1}" type="datetimeFigureOut">
               <a:rPr lang="en-RO" smtClean="0"/>
-              <a:t>26.03.2024</a:t>
+              <a:t>27.03.2024</a:t>
             </a:fld>
             <a:endParaRPr lang="en-RO"/>
           </a:p>
@@ -1981,7 +1986,7 @@
           <a:p>
             <a:fld id="{D098051C-B3F8-164A-B288-2D47518C9AA1}" type="datetimeFigureOut">
               <a:rPr lang="en-RO" smtClean="0"/>
-              <a:t>26.03.2024</a:t>
+              <a:t>27.03.2024</a:t>
             </a:fld>
             <a:endParaRPr lang="en-RO"/>
           </a:p>
@@ -2094,7 +2099,7 @@
           <a:p>
             <a:fld id="{D098051C-B3F8-164A-B288-2D47518C9AA1}" type="datetimeFigureOut">
               <a:rPr lang="en-RO" smtClean="0"/>
-              <a:t>26.03.2024</a:t>
+              <a:t>27.03.2024</a:t>
             </a:fld>
             <a:endParaRPr lang="en-RO"/>
           </a:p>
@@ -2407,7 +2412,7 @@
           <a:p>
             <a:fld id="{D098051C-B3F8-164A-B288-2D47518C9AA1}" type="datetimeFigureOut">
               <a:rPr lang="en-RO" smtClean="0"/>
-              <a:t>26.03.2024</a:t>
+              <a:t>27.03.2024</a:t>
             </a:fld>
             <a:endParaRPr lang="en-RO"/>
           </a:p>
@@ -2696,7 +2701,7 @@
           <a:p>
             <a:fld id="{D098051C-B3F8-164A-B288-2D47518C9AA1}" type="datetimeFigureOut">
               <a:rPr lang="en-RO" smtClean="0"/>
-              <a:t>26.03.2024</a:t>
+              <a:t>27.03.2024</a:t>
             </a:fld>
             <a:endParaRPr lang="en-RO"/>
           </a:p>
@@ -2939,7 +2944,7 @@
           <a:p>
             <a:fld id="{D098051C-B3F8-164A-B288-2D47518C9AA1}" type="datetimeFigureOut">
               <a:rPr lang="en-RO" smtClean="0"/>
-              <a:t>26.03.2024</a:t>
+              <a:t>27.03.2024</a:t>
             </a:fld>
             <a:endParaRPr lang="en-RO"/>
           </a:p>
@@ -12065,7 +12070,7 @@
           <a:p>
             <a:pPr algn="l"/>
             <a:r>
-              <a:rPr lang="en-RO" sz="5000">
+              <a:rPr lang="en-RO" sz="5000" dirty="0">
                 <a:solidFill>
                   <a:srgbClr val="FFFFFF"/>
                 </a:solidFill>
@@ -12073,59 +12078,19 @@
               <a:t>OOP</a:t>
             </a:r>
             <a:br>
-              <a:rPr lang="en-RO" sz="5000">
+              <a:rPr lang="en-RO" sz="5000" dirty="0">
                 <a:solidFill>
                   <a:srgbClr val="FFFFFF"/>
                 </a:solidFill>
               </a:rPr>
             </a:br>
             <a:r>
-              <a:rPr lang="en-RO" sz="5000">
+              <a:rPr lang="en-RO" sz="5000" dirty="0">
                 <a:solidFill>
                   <a:srgbClr val="FFFFFF"/>
                 </a:solidFill>
               </a:rPr>
               <a:t>(Object Oriented Programming)</a:t>
-            </a:r>
-          </a:p>
-        </p:txBody>
-      </p:sp>
-      <p:sp>
-        <p:nvSpPr>
-          <p:cNvPr id="3" name="Subtitle 2">
-            <a:extLst>
-              <a:ext uri="{FF2B5EF4-FFF2-40B4-BE49-F238E27FC236}">
-                <a16:creationId xmlns:a16="http://schemas.microsoft.com/office/drawing/2014/main" id="{5D6273C7-1297-71B2-D1CF-B091F2C93C0A}"/>
-              </a:ext>
-            </a:extLst>
-          </p:cNvPr>
-          <p:cNvSpPr>
-            <a:spLocks noGrp="1"/>
-          </p:cNvSpPr>
-          <p:nvPr>
-            <p:ph type="subTitle" idx="1"/>
-          </p:nvPr>
-        </p:nvSpPr>
-        <p:spPr>
-          <a:xfrm>
-            <a:off x="835024" y="3809999"/>
-            <a:ext cx="7025753" cy="1012778"/>
-          </a:xfrm>
-        </p:spPr>
-        <p:txBody>
-          <a:bodyPr>
-            <a:normAutofit/>
-          </a:bodyPr>
-          <a:lstStyle/>
-          <a:p>
-            <a:pPr algn="l"/>
-            <a:r>
-              <a:rPr lang="en-RO" dirty="0">
-                <a:solidFill>
-                  <a:srgbClr val="FFFFFF"/>
-                </a:solidFill>
-              </a:rPr>
-              <a:t>Principiile OOP</a:t>
             </a:r>
           </a:p>
         </p:txBody>
@@ -12223,7 +12188,7 @@
                   <a:schemeClr val="bg1"/>
                 </a:solidFill>
               </a:rPr>
-              <a:t>3.3. Ce este un constructor?</a:t>
+              <a:t>4.3. Ce este un constructor?</a:t>
             </a:r>
           </a:p>
         </p:txBody>
@@ -12319,6 +12284,2261 @@
     <p:extLst>
       <p:ext uri="{BB962C8B-B14F-4D97-AF65-F5344CB8AC3E}">
         <p14:creationId xmlns:p14="http://schemas.microsoft.com/office/powerpoint/2010/main" val="178158671"/>
+      </p:ext>
+    </p:extLst>
+  </p:cSld>
+  <p:clrMapOvr>
+    <a:masterClrMapping/>
+  </p:clrMapOvr>
+</p:sld>
+</file>
+
+<file path=ppt/slides/slide11.xml><?xml version="1.0" encoding="utf-8"?>
+<p:sld xmlns:a="http://schemas.openxmlformats.org/drawingml/2006/main" xmlns:r="http://schemas.openxmlformats.org/officeDocument/2006/relationships" xmlns:p="http://schemas.openxmlformats.org/presentationml/2006/main">
+  <p:cSld>
+    <p:spTree>
+      <p:nvGrpSpPr>
+        <p:cNvPr id="1" name=""/>
+        <p:cNvGrpSpPr/>
+        <p:nvPr/>
+      </p:nvGrpSpPr>
+      <p:grpSpPr>
+        <a:xfrm>
+          <a:off x="0" y="0"/>
+          <a:ext cx="0" cy="0"/>
+          <a:chOff x="0" y="0"/>
+          <a:chExt cx="0" cy="0"/>
+        </a:xfrm>
+      </p:grpSpPr>
+      <p:pic>
+        <p:nvPicPr>
+          <p:cNvPr id="4" name="Picture 3" descr="A black rectangular object with white lines&#10;&#10;Description automatically generated">
+            <a:extLst>
+              <a:ext uri="{FF2B5EF4-FFF2-40B4-BE49-F238E27FC236}">
+                <a16:creationId xmlns:a16="http://schemas.microsoft.com/office/drawing/2014/main" id="{0AF48C89-2319-115E-2C20-FDF0316E570A}"/>
+              </a:ext>
+            </a:extLst>
+          </p:cNvPr>
+          <p:cNvPicPr>
+            <a:picLocks noChangeAspect="1"/>
+          </p:cNvPicPr>
+          <p:nvPr/>
+        </p:nvPicPr>
+        <p:blipFill rotWithShape="1">
+          <a:blip r:embed="rId2"/>
+          <a:srcRect l="1333"/>
+          <a:stretch/>
+        </p:blipFill>
+        <p:spPr>
+          <a:xfrm>
+            <a:off x="457199" y="439841"/>
+            <a:ext cx="11277600" cy="5943600"/>
+          </a:xfrm>
+          <a:prstGeom prst="rect">
+            <a:avLst/>
+          </a:prstGeom>
+        </p:spPr>
+      </p:pic>
+      <p:sp>
+        <p:nvSpPr>
+          <p:cNvPr id="6" name="TextBox 5">
+            <a:extLst>
+              <a:ext uri="{FF2B5EF4-FFF2-40B4-BE49-F238E27FC236}">
+                <a16:creationId xmlns:a16="http://schemas.microsoft.com/office/drawing/2014/main" id="{0836E033-C21E-85BB-D8A5-588CD2CBD1D8}"/>
+              </a:ext>
+            </a:extLst>
+          </p:cNvPr>
+          <p:cNvSpPr txBox="1"/>
+          <p:nvPr/>
+        </p:nvSpPr>
+        <p:spPr>
+          <a:xfrm>
+            <a:off x="909636" y="474559"/>
+            <a:ext cx="5186363" cy="584775"/>
+          </a:xfrm>
+          <a:prstGeom prst="rect">
+            <a:avLst/>
+          </a:prstGeom>
+          <a:noFill/>
+        </p:spPr>
+        <p:txBody>
+          <a:bodyPr wrap="square" rtlCol="0">
+            <a:spAutoFit/>
+          </a:bodyPr>
+          <a:lstStyle/>
+          <a:p>
+            <a:r>
+              <a:rPr lang="en-RO" sz="3200" dirty="0">
+                <a:solidFill>
+                  <a:schemeClr val="bg1"/>
+                </a:solidFill>
+              </a:rPr>
+              <a:t>5. Operatorul this</a:t>
+            </a:r>
+          </a:p>
+        </p:txBody>
+      </p:sp>
+      <p:pic>
+        <p:nvPicPr>
+          <p:cNvPr id="5" name="Picture 4">
+            <a:extLst>
+              <a:ext uri="{FF2B5EF4-FFF2-40B4-BE49-F238E27FC236}">
+                <a16:creationId xmlns:a16="http://schemas.microsoft.com/office/drawing/2014/main" id="{E2CB54A7-8BB8-AE5F-A32B-3EE33B2E8280}"/>
+              </a:ext>
+            </a:extLst>
+          </p:cNvPr>
+          <p:cNvPicPr>
+            <a:picLocks noChangeAspect="1"/>
+          </p:cNvPicPr>
+          <p:nvPr/>
+        </p:nvPicPr>
+        <p:blipFill>
+          <a:blip r:embed="rId3"/>
+          <a:stretch>
+            <a:fillRect/>
+          </a:stretch>
+        </p:blipFill>
+        <p:spPr>
+          <a:xfrm>
+            <a:off x="3697595" y="1523358"/>
+            <a:ext cx="7510958" cy="3567257"/>
+          </a:xfrm>
+          <a:prstGeom prst="rect">
+            <a:avLst/>
+          </a:prstGeom>
+        </p:spPr>
+      </p:pic>
+      <p:sp>
+        <p:nvSpPr>
+          <p:cNvPr id="7" name="TextBox 6">
+            <a:extLst>
+              <a:ext uri="{FF2B5EF4-FFF2-40B4-BE49-F238E27FC236}">
+                <a16:creationId xmlns:a16="http://schemas.microsoft.com/office/drawing/2014/main" id="{D9993860-FC32-251D-69FD-D05A128B1411}"/>
+              </a:ext>
+            </a:extLst>
+          </p:cNvPr>
+          <p:cNvSpPr txBox="1"/>
+          <p:nvPr/>
+        </p:nvSpPr>
+        <p:spPr>
+          <a:xfrm>
+            <a:off x="654410" y="1957696"/>
+            <a:ext cx="3043185" cy="2308324"/>
+          </a:xfrm>
+          <a:prstGeom prst="rect">
+            <a:avLst/>
+          </a:prstGeom>
+          <a:noFill/>
+        </p:spPr>
+        <p:txBody>
+          <a:bodyPr wrap="square" rtlCol="0">
+            <a:spAutoFit/>
+          </a:bodyPr>
+          <a:lstStyle/>
+          <a:p>
+            <a:r>
+              <a:rPr lang="en-GB" dirty="0">
+                <a:solidFill>
+                  <a:schemeClr val="bg1"/>
+                </a:solidFill>
+              </a:rPr>
+              <a:t>1. </a:t>
+            </a:r>
+            <a:r>
+              <a:rPr lang="en-GB" dirty="0" err="1">
+                <a:solidFill>
+                  <a:schemeClr val="bg1"/>
+                </a:solidFill>
+              </a:rPr>
+              <a:t>Cuvântul</a:t>
+            </a:r>
+            <a:r>
+              <a:rPr lang="en-GB" dirty="0">
+                <a:solidFill>
+                  <a:schemeClr val="bg1"/>
+                </a:solidFill>
+              </a:rPr>
+              <a:t> </a:t>
+            </a:r>
+            <a:r>
+              <a:rPr lang="en-GB" dirty="0" err="1">
+                <a:solidFill>
+                  <a:schemeClr val="bg1"/>
+                </a:solidFill>
+              </a:rPr>
+              <a:t>cheie</a:t>
+            </a:r>
+            <a:r>
+              <a:rPr lang="en-GB" dirty="0">
+                <a:solidFill>
+                  <a:schemeClr val="bg1"/>
+                </a:solidFill>
+              </a:rPr>
+              <a:t> this se </a:t>
+            </a:r>
+            <a:r>
+              <a:rPr lang="en-GB" dirty="0" err="1">
+                <a:solidFill>
+                  <a:schemeClr val="bg1"/>
+                </a:solidFill>
+              </a:rPr>
+              <a:t>referă</a:t>
+            </a:r>
+            <a:r>
+              <a:rPr lang="en-GB" dirty="0">
+                <a:solidFill>
+                  <a:schemeClr val="bg1"/>
+                </a:solidFill>
+              </a:rPr>
+              <a:t> la </a:t>
+            </a:r>
+            <a:r>
+              <a:rPr lang="en-GB" dirty="0" err="1">
+                <a:solidFill>
+                  <a:schemeClr val="bg1"/>
+                </a:solidFill>
+              </a:rPr>
+              <a:t>obiectul</a:t>
+            </a:r>
+            <a:r>
+              <a:rPr lang="en-GB" dirty="0">
+                <a:solidFill>
+                  <a:schemeClr val="bg1"/>
+                </a:solidFill>
+              </a:rPr>
+              <a:t> </a:t>
+            </a:r>
+            <a:r>
+              <a:rPr lang="en-GB" dirty="0" err="1">
+                <a:solidFill>
+                  <a:schemeClr val="bg1"/>
+                </a:solidFill>
+              </a:rPr>
+              <a:t>curent</a:t>
+            </a:r>
+            <a:r>
+              <a:rPr lang="en-GB" dirty="0">
+                <a:solidFill>
+                  <a:schemeClr val="bg1"/>
+                </a:solidFill>
+              </a:rPr>
+              <a:t> </a:t>
+            </a:r>
+            <a:r>
+              <a:rPr lang="en-GB" dirty="0" err="1">
+                <a:solidFill>
+                  <a:schemeClr val="bg1"/>
+                </a:solidFill>
+              </a:rPr>
+              <a:t>dintr</a:t>
+            </a:r>
+            <a:r>
+              <a:rPr lang="en-GB" dirty="0">
+                <a:solidFill>
+                  <a:schemeClr val="bg1"/>
+                </a:solidFill>
+              </a:rPr>
+              <a:t>-o </a:t>
+            </a:r>
+            <a:r>
+              <a:rPr lang="en-GB" dirty="0" err="1">
+                <a:solidFill>
+                  <a:schemeClr val="bg1"/>
+                </a:solidFill>
+              </a:rPr>
+              <a:t>metodă</a:t>
+            </a:r>
+            <a:r>
+              <a:rPr lang="en-GB" dirty="0">
+                <a:solidFill>
+                  <a:schemeClr val="bg1"/>
+                </a:solidFill>
+              </a:rPr>
+              <a:t> </a:t>
+            </a:r>
+            <a:r>
+              <a:rPr lang="en-GB" dirty="0" err="1">
+                <a:solidFill>
+                  <a:schemeClr val="bg1"/>
+                </a:solidFill>
+              </a:rPr>
+              <a:t>sau</a:t>
+            </a:r>
+            <a:r>
+              <a:rPr lang="en-GB" dirty="0">
+                <a:solidFill>
+                  <a:schemeClr val="bg1"/>
+                </a:solidFill>
+              </a:rPr>
+              <a:t> un constructor.</a:t>
+            </a:r>
+          </a:p>
+          <a:p>
+            <a:r>
+              <a:rPr lang="en-GB" dirty="0">
+                <a:solidFill>
+                  <a:schemeClr val="bg1"/>
+                </a:solidFill>
+              </a:rPr>
+              <a:t>2. Dar se </a:t>
+            </a:r>
+            <a:r>
+              <a:rPr lang="en-GB" dirty="0" err="1">
+                <a:solidFill>
+                  <a:schemeClr val="bg1"/>
+                </a:solidFill>
+              </a:rPr>
+              <a:t>poate</a:t>
+            </a:r>
+            <a:r>
+              <a:rPr lang="en-GB" dirty="0">
+                <a:solidFill>
+                  <a:schemeClr val="bg1"/>
+                </a:solidFill>
+              </a:rPr>
+              <a:t> </a:t>
+            </a:r>
+            <a:r>
+              <a:rPr lang="en-GB" dirty="0" err="1">
+                <a:solidFill>
+                  <a:schemeClr val="bg1"/>
+                </a:solidFill>
+              </a:rPr>
+              <a:t>referi</a:t>
+            </a:r>
+            <a:r>
+              <a:rPr lang="en-GB" dirty="0">
+                <a:solidFill>
+                  <a:schemeClr val="bg1"/>
+                </a:solidFill>
+              </a:rPr>
+              <a:t> </a:t>
+            </a:r>
+            <a:r>
+              <a:rPr lang="en-GB" dirty="0" err="1">
+                <a:solidFill>
+                  <a:schemeClr val="bg1"/>
+                </a:solidFill>
+              </a:rPr>
+              <a:t>si</a:t>
+            </a:r>
+            <a:r>
+              <a:rPr lang="en-GB" dirty="0">
+                <a:solidFill>
+                  <a:schemeClr val="bg1"/>
+                </a:solidFill>
+              </a:rPr>
+              <a:t> la </a:t>
+            </a:r>
+            <a:r>
+              <a:rPr lang="en-GB" dirty="0" err="1">
+                <a:solidFill>
+                  <a:schemeClr val="bg1"/>
+                </a:solidFill>
+              </a:rPr>
+              <a:t>constructorul</a:t>
+            </a:r>
+            <a:r>
+              <a:rPr lang="en-GB" dirty="0">
+                <a:solidFill>
+                  <a:schemeClr val="bg1"/>
+                </a:solidFill>
+              </a:rPr>
+              <a:t> care se </a:t>
+            </a:r>
+            <a:r>
+              <a:rPr lang="en-GB" dirty="0" err="1">
+                <a:solidFill>
+                  <a:schemeClr val="bg1"/>
+                </a:solidFill>
+              </a:rPr>
+              <a:t>potriveste</a:t>
+            </a:r>
+            <a:r>
+              <a:rPr lang="en-GB" dirty="0">
+                <a:solidFill>
+                  <a:schemeClr val="bg1"/>
+                </a:solidFill>
+              </a:rPr>
+              <a:t> cu </a:t>
+            </a:r>
+            <a:r>
+              <a:rPr lang="en-GB" dirty="0" err="1">
+                <a:solidFill>
+                  <a:schemeClr val="bg1"/>
+                </a:solidFill>
+              </a:rPr>
+              <a:t>numarul</a:t>
+            </a:r>
+            <a:r>
+              <a:rPr lang="en-GB" dirty="0">
+                <a:solidFill>
+                  <a:schemeClr val="bg1"/>
+                </a:solidFill>
+              </a:rPr>
+              <a:t> de </a:t>
+            </a:r>
+            <a:r>
+              <a:rPr lang="en-GB" dirty="0" err="1">
+                <a:solidFill>
+                  <a:schemeClr val="bg1"/>
+                </a:solidFill>
+              </a:rPr>
+              <a:t>parametri</a:t>
+            </a:r>
+            <a:endParaRPr lang="en-RO" dirty="0">
+              <a:solidFill>
+                <a:schemeClr val="bg1"/>
+              </a:solidFill>
+            </a:endParaRPr>
+          </a:p>
+        </p:txBody>
+      </p:sp>
+    </p:spTree>
+    <p:extLst>
+      <p:ext uri="{BB962C8B-B14F-4D97-AF65-F5344CB8AC3E}">
+        <p14:creationId xmlns:p14="http://schemas.microsoft.com/office/powerpoint/2010/main" val="3108135982"/>
+      </p:ext>
+    </p:extLst>
+  </p:cSld>
+  <p:clrMapOvr>
+    <a:masterClrMapping/>
+  </p:clrMapOvr>
+</p:sld>
+</file>
+
+<file path=ppt/slides/slide12.xml><?xml version="1.0" encoding="utf-8"?>
+<p:sld xmlns:a="http://schemas.openxmlformats.org/drawingml/2006/main" xmlns:r="http://schemas.openxmlformats.org/officeDocument/2006/relationships" xmlns:p="http://schemas.openxmlformats.org/presentationml/2006/main">
+  <p:cSld>
+    <p:spTree>
+      <p:nvGrpSpPr>
+        <p:cNvPr id="1" name=""/>
+        <p:cNvGrpSpPr/>
+        <p:nvPr/>
+      </p:nvGrpSpPr>
+      <p:grpSpPr>
+        <a:xfrm>
+          <a:off x="0" y="0"/>
+          <a:ext cx="0" cy="0"/>
+          <a:chOff x="0" y="0"/>
+          <a:chExt cx="0" cy="0"/>
+        </a:xfrm>
+      </p:grpSpPr>
+      <p:pic>
+        <p:nvPicPr>
+          <p:cNvPr id="4" name="Picture 3" descr="A black rectangular object with white lines&#10;&#10;Description automatically generated">
+            <a:extLst>
+              <a:ext uri="{FF2B5EF4-FFF2-40B4-BE49-F238E27FC236}">
+                <a16:creationId xmlns:a16="http://schemas.microsoft.com/office/drawing/2014/main" id="{0AF48C89-2319-115E-2C20-FDF0316E570A}"/>
+              </a:ext>
+            </a:extLst>
+          </p:cNvPr>
+          <p:cNvPicPr>
+            <a:picLocks noChangeAspect="1"/>
+          </p:cNvPicPr>
+          <p:nvPr/>
+        </p:nvPicPr>
+        <p:blipFill rotWithShape="1">
+          <a:blip r:embed="rId2"/>
+          <a:srcRect l="1333"/>
+          <a:stretch/>
+        </p:blipFill>
+        <p:spPr>
+          <a:xfrm>
+            <a:off x="457199" y="439841"/>
+            <a:ext cx="11277600" cy="5943600"/>
+          </a:xfrm>
+          <a:prstGeom prst="rect">
+            <a:avLst/>
+          </a:prstGeom>
+        </p:spPr>
+      </p:pic>
+      <p:sp>
+        <p:nvSpPr>
+          <p:cNvPr id="6" name="TextBox 5">
+            <a:extLst>
+              <a:ext uri="{FF2B5EF4-FFF2-40B4-BE49-F238E27FC236}">
+                <a16:creationId xmlns:a16="http://schemas.microsoft.com/office/drawing/2014/main" id="{0836E033-C21E-85BB-D8A5-588CD2CBD1D8}"/>
+              </a:ext>
+            </a:extLst>
+          </p:cNvPr>
+          <p:cNvSpPr txBox="1"/>
+          <p:nvPr/>
+        </p:nvSpPr>
+        <p:spPr>
+          <a:xfrm>
+            <a:off x="909636" y="474559"/>
+            <a:ext cx="8440104" cy="584775"/>
+          </a:xfrm>
+          <a:prstGeom prst="rect">
+            <a:avLst/>
+          </a:prstGeom>
+          <a:noFill/>
+        </p:spPr>
+        <p:txBody>
+          <a:bodyPr wrap="square" rtlCol="0">
+            <a:spAutoFit/>
+          </a:bodyPr>
+          <a:lstStyle/>
+          <a:p>
+            <a:r>
+              <a:rPr lang="en-RO" sz="3200" dirty="0">
+                <a:solidFill>
+                  <a:schemeClr val="bg1"/>
+                </a:solidFill>
+              </a:rPr>
+              <a:t>6. Cum apelam o metoda pe un obiect?</a:t>
+            </a:r>
+          </a:p>
+        </p:txBody>
+      </p:sp>
+      <p:sp>
+        <p:nvSpPr>
+          <p:cNvPr id="2" name="TextBox 1">
+            <a:extLst>
+              <a:ext uri="{FF2B5EF4-FFF2-40B4-BE49-F238E27FC236}">
+                <a16:creationId xmlns:a16="http://schemas.microsoft.com/office/drawing/2014/main" id="{8D81FA32-8887-621B-1C81-531E93D47744}"/>
+              </a:ext>
+            </a:extLst>
+          </p:cNvPr>
+          <p:cNvSpPr txBox="1"/>
+          <p:nvPr/>
+        </p:nvSpPr>
+        <p:spPr>
+          <a:xfrm>
+            <a:off x="457198" y="1011548"/>
+            <a:ext cx="10825165" cy="923330"/>
+          </a:xfrm>
+          <a:prstGeom prst="rect">
+            <a:avLst/>
+          </a:prstGeom>
+          <a:noFill/>
+        </p:spPr>
+        <p:txBody>
+          <a:bodyPr wrap="square" rtlCol="0">
+            <a:spAutoFit/>
+          </a:bodyPr>
+          <a:lstStyle/>
+          <a:p>
+            <a:pPr marL="285750" indent="-285750">
+              <a:buFont typeface="Arial" panose="020B0604020202020204" pitchFamily="34" charset="0"/>
+              <a:buChar char="•"/>
+            </a:pPr>
+            <a:r>
+              <a:rPr lang="en-GB" sz="1800" dirty="0" err="1">
+                <a:solidFill>
+                  <a:schemeClr val="bg1"/>
+                </a:solidFill>
+              </a:rPr>
+              <a:t>Punctul</a:t>
+            </a:r>
+            <a:r>
+              <a:rPr lang="en-GB" sz="1800" dirty="0">
+                <a:solidFill>
+                  <a:schemeClr val="bg1"/>
+                </a:solidFill>
+              </a:rPr>
+              <a:t> ( . ) </a:t>
+            </a:r>
+            <a:r>
+              <a:rPr lang="en-GB" sz="1800" dirty="0" err="1">
+                <a:solidFill>
+                  <a:schemeClr val="bg1"/>
+                </a:solidFill>
+              </a:rPr>
+              <a:t>este</a:t>
+            </a:r>
+            <a:r>
+              <a:rPr lang="en-GB" sz="1800" dirty="0">
+                <a:solidFill>
+                  <a:schemeClr val="bg1"/>
+                </a:solidFill>
+              </a:rPr>
+              <a:t> </a:t>
+            </a:r>
+            <a:r>
+              <a:rPr lang="en-GB" sz="1800" dirty="0" err="1">
+                <a:solidFill>
+                  <a:schemeClr val="bg1"/>
+                </a:solidFill>
+              </a:rPr>
+              <a:t>folosit</a:t>
+            </a:r>
+            <a:r>
+              <a:rPr lang="en-GB" sz="1800" dirty="0">
+                <a:solidFill>
+                  <a:schemeClr val="bg1"/>
+                </a:solidFill>
+              </a:rPr>
+              <a:t> </a:t>
+            </a:r>
+            <a:r>
+              <a:rPr lang="en-GB" sz="1800" dirty="0" err="1">
+                <a:solidFill>
+                  <a:schemeClr val="bg1"/>
+                </a:solidFill>
+              </a:rPr>
+              <a:t>pentru</a:t>
+            </a:r>
+            <a:r>
+              <a:rPr lang="en-GB" sz="1800" dirty="0">
+                <a:solidFill>
+                  <a:schemeClr val="bg1"/>
+                </a:solidFill>
+              </a:rPr>
+              <a:t> a </a:t>
+            </a:r>
+            <a:r>
+              <a:rPr lang="en-GB" sz="1800" dirty="0" err="1">
+                <a:solidFill>
+                  <a:schemeClr val="bg1"/>
+                </a:solidFill>
+              </a:rPr>
+              <a:t>accesa</a:t>
+            </a:r>
+            <a:r>
+              <a:rPr lang="en-GB" sz="1800" dirty="0">
+                <a:solidFill>
+                  <a:schemeClr val="bg1"/>
+                </a:solidFill>
+              </a:rPr>
+              <a:t> </a:t>
+            </a:r>
+            <a:r>
+              <a:rPr lang="en-GB" sz="1800" dirty="0" err="1">
+                <a:solidFill>
+                  <a:schemeClr val="bg1"/>
+                </a:solidFill>
+              </a:rPr>
+              <a:t>atributele</a:t>
+            </a:r>
+            <a:r>
+              <a:rPr lang="en-GB" sz="1800" dirty="0">
+                <a:solidFill>
+                  <a:schemeClr val="bg1"/>
+                </a:solidFill>
+              </a:rPr>
+              <a:t> </a:t>
+            </a:r>
+            <a:r>
+              <a:rPr lang="en-GB" sz="1800" dirty="0" err="1">
+                <a:solidFill>
+                  <a:schemeClr val="bg1"/>
+                </a:solidFill>
+              </a:rPr>
+              <a:t>și</a:t>
+            </a:r>
+            <a:r>
+              <a:rPr lang="en-GB" sz="1800" dirty="0">
+                <a:solidFill>
+                  <a:schemeClr val="bg1"/>
+                </a:solidFill>
+              </a:rPr>
+              <a:t> </a:t>
+            </a:r>
+            <a:r>
+              <a:rPr lang="en-GB" sz="1800" dirty="0" err="1">
+                <a:solidFill>
+                  <a:schemeClr val="bg1"/>
+                </a:solidFill>
+              </a:rPr>
+              <a:t>metodele</a:t>
+            </a:r>
+            <a:r>
+              <a:rPr lang="en-GB" sz="1800" dirty="0">
+                <a:solidFill>
+                  <a:schemeClr val="bg1"/>
+                </a:solidFill>
+              </a:rPr>
+              <a:t> </a:t>
+            </a:r>
+            <a:r>
+              <a:rPr lang="en-GB" sz="1800" dirty="0" err="1">
+                <a:solidFill>
+                  <a:schemeClr val="bg1"/>
+                </a:solidFill>
+              </a:rPr>
+              <a:t>obiectului</a:t>
+            </a:r>
+            <a:r>
+              <a:rPr lang="en-GB" sz="1800" dirty="0">
+                <a:solidFill>
+                  <a:schemeClr val="bg1"/>
+                </a:solidFill>
+              </a:rPr>
+              <a:t>. </a:t>
+            </a:r>
+            <a:r>
+              <a:rPr lang="en-GB" sz="1800" dirty="0" err="1">
+                <a:solidFill>
+                  <a:schemeClr val="bg1"/>
+                </a:solidFill>
+              </a:rPr>
+              <a:t>Pentru</a:t>
+            </a:r>
+            <a:r>
+              <a:rPr lang="en-GB" sz="1800" dirty="0">
+                <a:solidFill>
+                  <a:schemeClr val="bg1"/>
+                </a:solidFill>
+              </a:rPr>
+              <a:t> a </a:t>
+            </a:r>
+            <a:r>
+              <a:rPr lang="en-GB" sz="1800" dirty="0" err="1">
+                <a:solidFill>
+                  <a:schemeClr val="bg1"/>
+                </a:solidFill>
+              </a:rPr>
+              <a:t>apela</a:t>
+            </a:r>
+            <a:r>
+              <a:rPr lang="en-GB" sz="1800" dirty="0">
+                <a:solidFill>
+                  <a:schemeClr val="bg1"/>
+                </a:solidFill>
+              </a:rPr>
+              <a:t> o </a:t>
+            </a:r>
+            <a:r>
+              <a:rPr lang="en-GB" sz="1800" dirty="0" err="1">
+                <a:solidFill>
+                  <a:schemeClr val="bg1"/>
+                </a:solidFill>
+              </a:rPr>
+              <a:t>metodă</a:t>
+            </a:r>
+            <a:r>
+              <a:rPr lang="en-GB" sz="1800" dirty="0">
+                <a:solidFill>
+                  <a:schemeClr val="bg1"/>
+                </a:solidFill>
+              </a:rPr>
+              <a:t> </a:t>
+            </a:r>
+            <a:r>
+              <a:rPr lang="en-GB" sz="1800" dirty="0" err="1">
+                <a:solidFill>
+                  <a:schemeClr val="bg1"/>
+                </a:solidFill>
+              </a:rPr>
+              <a:t>în</a:t>
+            </a:r>
+            <a:r>
+              <a:rPr lang="en-GB" sz="1800" dirty="0">
+                <a:solidFill>
+                  <a:schemeClr val="bg1"/>
+                </a:solidFill>
+              </a:rPr>
+              <a:t> Java, </a:t>
+            </a:r>
+            <a:r>
+              <a:rPr lang="en-GB" sz="1800" dirty="0" err="1">
+                <a:solidFill>
+                  <a:schemeClr val="bg1"/>
+                </a:solidFill>
+              </a:rPr>
+              <a:t>scrieți</a:t>
+            </a:r>
+            <a:r>
+              <a:rPr lang="en-GB" sz="1800" dirty="0">
+                <a:solidFill>
+                  <a:schemeClr val="bg1"/>
+                </a:solidFill>
+              </a:rPr>
+              <a:t> </a:t>
+            </a:r>
+            <a:r>
+              <a:rPr lang="en-GB" sz="1800" dirty="0" err="1">
+                <a:solidFill>
+                  <a:schemeClr val="bg1"/>
+                </a:solidFill>
+              </a:rPr>
+              <a:t>numele</a:t>
+            </a:r>
+            <a:r>
+              <a:rPr lang="en-GB" sz="1800" dirty="0">
+                <a:solidFill>
+                  <a:schemeClr val="bg1"/>
+                </a:solidFill>
+              </a:rPr>
+              <a:t> </a:t>
+            </a:r>
+            <a:r>
+              <a:rPr lang="en-GB" sz="1800" dirty="0" err="1">
+                <a:solidFill>
+                  <a:schemeClr val="bg1"/>
+                </a:solidFill>
+              </a:rPr>
+              <a:t>metodei</a:t>
+            </a:r>
+            <a:r>
+              <a:rPr lang="en-GB" sz="1800" dirty="0">
+                <a:solidFill>
+                  <a:schemeClr val="bg1"/>
+                </a:solidFill>
+              </a:rPr>
+              <a:t> </a:t>
+            </a:r>
+            <a:r>
+              <a:rPr lang="en-GB" sz="1800" dirty="0" err="1">
+                <a:solidFill>
+                  <a:schemeClr val="bg1"/>
+                </a:solidFill>
+              </a:rPr>
+              <a:t>urmat</a:t>
+            </a:r>
+            <a:r>
+              <a:rPr lang="en-GB" sz="1800" dirty="0">
+                <a:solidFill>
+                  <a:schemeClr val="bg1"/>
+                </a:solidFill>
+              </a:rPr>
+              <a:t> de un set de </a:t>
+            </a:r>
+            <a:r>
+              <a:rPr lang="en-GB" sz="1800" dirty="0" err="1">
+                <a:solidFill>
+                  <a:schemeClr val="bg1"/>
+                </a:solidFill>
+              </a:rPr>
+              <a:t>paranteze</a:t>
+            </a:r>
+            <a:r>
+              <a:rPr lang="en-GB" sz="1800" dirty="0">
+                <a:solidFill>
+                  <a:schemeClr val="bg1"/>
+                </a:solidFill>
+              </a:rPr>
+              <a:t> (), </a:t>
+            </a:r>
+            <a:r>
+              <a:rPr lang="en-GB" sz="1800" dirty="0" err="1">
+                <a:solidFill>
+                  <a:schemeClr val="bg1"/>
+                </a:solidFill>
+              </a:rPr>
+              <a:t>urmat</a:t>
+            </a:r>
+            <a:r>
+              <a:rPr lang="en-GB" sz="1800" dirty="0">
+                <a:solidFill>
+                  <a:schemeClr val="bg1"/>
+                </a:solidFill>
+              </a:rPr>
+              <a:t> de un </a:t>
+            </a:r>
+            <a:r>
+              <a:rPr lang="en-GB" sz="1800" dirty="0" err="1">
+                <a:solidFill>
+                  <a:schemeClr val="bg1"/>
+                </a:solidFill>
+              </a:rPr>
+              <a:t>punct</a:t>
+            </a:r>
+            <a:r>
+              <a:rPr lang="en-GB" sz="1800" dirty="0">
+                <a:solidFill>
+                  <a:schemeClr val="bg1"/>
+                </a:solidFill>
+              </a:rPr>
+              <a:t> </a:t>
+            </a:r>
+            <a:r>
+              <a:rPr lang="en-GB" sz="1800" dirty="0" err="1">
+                <a:solidFill>
+                  <a:schemeClr val="bg1"/>
+                </a:solidFill>
+              </a:rPr>
+              <a:t>și</a:t>
+            </a:r>
+            <a:r>
+              <a:rPr lang="en-GB" sz="1800" dirty="0">
+                <a:solidFill>
+                  <a:schemeClr val="bg1"/>
+                </a:solidFill>
+              </a:rPr>
+              <a:t> </a:t>
+            </a:r>
+            <a:r>
+              <a:rPr lang="en-GB" sz="1800" dirty="0" err="1">
+                <a:solidFill>
+                  <a:schemeClr val="bg1"/>
+                </a:solidFill>
+              </a:rPr>
+              <a:t>virgulă</a:t>
+            </a:r>
+            <a:r>
+              <a:rPr lang="en-GB" sz="1800" dirty="0">
+                <a:solidFill>
+                  <a:schemeClr val="bg1"/>
+                </a:solidFill>
+              </a:rPr>
+              <a:t> ( ; ). O </a:t>
+            </a:r>
+            <a:r>
+              <a:rPr lang="en-GB" sz="1800" dirty="0" err="1">
+                <a:solidFill>
+                  <a:schemeClr val="bg1"/>
+                </a:solidFill>
+              </a:rPr>
+              <a:t>clasă</a:t>
+            </a:r>
+            <a:r>
+              <a:rPr lang="en-GB" sz="1800" dirty="0">
+                <a:solidFill>
+                  <a:schemeClr val="bg1"/>
+                </a:solidFill>
+              </a:rPr>
+              <a:t> </a:t>
+            </a:r>
+            <a:r>
+              <a:rPr lang="en-GB" sz="1800" dirty="0" err="1">
+                <a:solidFill>
+                  <a:schemeClr val="bg1"/>
+                </a:solidFill>
+              </a:rPr>
+              <a:t>trebuie</a:t>
+            </a:r>
+            <a:r>
+              <a:rPr lang="en-GB" sz="1800" dirty="0">
+                <a:solidFill>
+                  <a:schemeClr val="bg1"/>
+                </a:solidFill>
+              </a:rPr>
+              <a:t> </a:t>
+            </a:r>
+            <a:r>
+              <a:rPr lang="en-GB" sz="1800" dirty="0" err="1">
+                <a:solidFill>
+                  <a:schemeClr val="bg1"/>
+                </a:solidFill>
+              </a:rPr>
+              <a:t>să</a:t>
+            </a:r>
+            <a:r>
+              <a:rPr lang="en-GB" sz="1800" dirty="0">
+                <a:solidFill>
+                  <a:schemeClr val="bg1"/>
+                </a:solidFill>
+              </a:rPr>
+              <a:t> </a:t>
+            </a:r>
+            <a:r>
+              <a:rPr lang="en-GB" sz="1800" dirty="0" err="1">
+                <a:solidFill>
+                  <a:schemeClr val="bg1"/>
+                </a:solidFill>
+              </a:rPr>
+              <a:t>aibă</a:t>
+            </a:r>
+            <a:r>
+              <a:rPr lang="en-GB" sz="1800" dirty="0">
+                <a:solidFill>
+                  <a:schemeClr val="bg1"/>
+                </a:solidFill>
+              </a:rPr>
+              <a:t> un </a:t>
+            </a:r>
+            <a:r>
+              <a:rPr lang="en-GB" sz="1800" dirty="0" err="1">
+                <a:solidFill>
+                  <a:schemeClr val="bg1"/>
+                </a:solidFill>
+              </a:rPr>
+              <a:t>nume</a:t>
+            </a:r>
+            <a:r>
+              <a:rPr lang="en-GB" sz="1800" dirty="0">
+                <a:solidFill>
+                  <a:schemeClr val="bg1"/>
+                </a:solidFill>
+              </a:rPr>
+              <a:t> de </a:t>
+            </a:r>
+            <a:r>
+              <a:rPr lang="en-GB" sz="1800" dirty="0" err="1">
+                <a:solidFill>
+                  <a:schemeClr val="bg1"/>
+                </a:solidFill>
+              </a:rPr>
+              <a:t>fișier</a:t>
+            </a:r>
+            <a:r>
+              <a:rPr lang="en-GB" sz="1800" dirty="0">
+                <a:solidFill>
+                  <a:schemeClr val="bg1"/>
+                </a:solidFill>
+              </a:rPr>
+              <a:t> care se </a:t>
+            </a:r>
+            <a:r>
+              <a:rPr lang="en-GB" sz="1800" dirty="0" err="1">
+                <a:solidFill>
+                  <a:schemeClr val="bg1"/>
+                </a:solidFill>
+              </a:rPr>
+              <a:t>potrivește</a:t>
+            </a:r>
+            <a:r>
+              <a:rPr lang="en-GB" sz="1800" dirty="0">
+                <a:solidFill>
+                  <a:schemeClr val="bg1"/>
+                </a:solidFill>
+              </a:rPr>
+              <a:t> ( Main </a:t>
+            </a:r>
+            <a:r>
+              <a:rPr lang="en-GB" sz="1800" dirty="0" err="1">
+                <a:solidFill>
+                  <a:schemeClr val="bg1"/>
+                </a:solidFill>
+              </a:rPr>
+              <a:t>și</a:t>
+            </a:r>
+            <a:r>
+              <a:rPr lang="en-GB" sz="1800" dirty="0">
+                <a:solidFill>
+                  <a:schemeClr val="bg1"/>
+                </a:solidFill>
+              </a:rPr>
+              <a:t> </a:t>
+            </a:r>
+            <a:r>
+              <a:rPr lang="en-GB" sz="1800" dirty="0" err="1">
+                <a:solidFill>
+                  <a:schemeClr val="bg1"/>
+                </a:solidFill>
+              </a:rPr>
+              <a:t>Main.java</a:t>
+            </a:r>
+            <a:r>
+              <a:rPr lang="en-GB" sz="1800" dirty="0">
+                <a:solidFill>
+                  <a:schemeClr val="bg1"/>
+                </a:solidFill>
+              </a:rPr>
+              <a:t>).</a:t>
+            </a:r>
+            <a:endParaRPr lang="en-RO" sz="1800" dirty="0">
+              <a:solidFill>
+                <a:schemeClr val="bg1"/>
+              </a:solidFill>
+            </a:endParaRPr>
+          </a:p>
+        </p:txBody>
+      </p:sp>
+      <p:pic>
+        <p:nvPicPr>
+          <p:cNvPr id="1028" name="Picture 4" descr="How to call a method from another Class Java">
+            <a:extLst>
+              <a:ext uri="{FF2B5EF4-FFF2-40B4-BE49-F238E27FC236}">
+                <a16:creationId xmlns:a16="http://schemas.microsoft.com/office/drawing/2014/main" id="{868A7131-0660-9AA1-364F-DB98B025707C}"/>
+              </a:ext>
+            </a:extLst>
+          </p:cNvPr>
+          <p:cNvPicPr>
+            <a:picLocks noChangeAspect="1" noChangeArrowheads="1"/>
+          </p:cNvPicPr>
+          <p:nvPr/>
+        </p:nvPicPr>
+        <p:blipFill>
+          <a:blip r:embed="rId3">
+            <a:extLst>
+              <a:ext uri="{28A0092B-C50C-407E-A947-70E740481C1C}">
+                <a14:useLocalDpi xmlns:a14="http://schemas.microsoft.com/office/drawing/2010/main" val="0"/>
+              </a:ext>
+            </a:extLst>
+          </a:blip>
+          <a:srcRect/>
+          <a:stretch>
+            <a:fillRect/>
+          </a:stretch>
+        </p:blipFill>
+        <p:spPr bwMode="auto">
+          <a:xfrm>
+            <a:off x="2970664" y="2245866"/>
+            <a:ext cx="6833193" cy="3826588"/>
+          </a:xfrm>
+          <a:prstGeom prst="rect">
+            <a:avLst/>
+          </a:prstGeom>
+          <a:noFill/>
+          <a:extLst>
+            <a:ext uri="{909E8E84-426E-40DD-AFC4-6F175D3DCCD1}">
+              <a14:hiddenFill xmlns:a14="http://schemas.microsoft.com/office/drawing/2010/main">
+                <a:solidFill>
+                  <a:srgbClr val="FFFFFF"/>
+                </a:solidFill>
+              </a14:hiddenFill>
+            </a:ext>
+          </a:extLst>
+        </p:spPr>
+      </p:pic>
+    </p:spTree>
+    <p:extLst>
+      <p:ext uri="{BB962C8B-B14F-4D97-AF65-F5344CB8AC3E}">
+        <p14:creationId xmlns:p14="http://schemas.microsoft.com/office/powerpoint/2010/main" val="466814278"/>
+      </p:ext>
+    </p:extLst>
+  </p:cSld>
+  <p:clrMapOvr>
+    <a:masterClrMapping/>
+  </p:clrMapOvr>
+</p:sld>
+</file>
+
+<file path=ppt/slides/slide13.xml><?xml version="1.0" encoding="utf-8"?>
+<p:sld xmlns:a="http://schemas.openxmlformats.org/drawingml/2006/main" xmlns:r="http://schemas.openxmlformats.org/officeDocument/2006/relationships" xmlns:p="http://schemas.openxmlformats.org/presentationml/2006/main">
+  <p:cSld>
+    <p:spTree>
+      <p:nvGrpSpPr>
+        <p:cNvPr id="1" name=""/>
+        <p:cNvGrpSpPr/>
+        <p:nvPr/>
+      </p:nvGrpSpPr>
+      <p:grpSpPr>
+        <a:xfrm>
+          <a:off x="0" y="0"/>
+          <a:ext cx="0" cy="0"/>
+          <a:chOff x="0" y="0"/>
+          <a:chExt cx="0" cy="0"/>
+        </a:xfrm>
+      </p:grpSpPr>
+      <p:pic>
+        <p:nvPicPr>
+          <p:cNvPr id="4" name="Picture 3" descr="A black rectangular object with white lines&#10;&#10;Description automatically generated">
+            <a:extLst>
+              <a:ext uri="{FF2B5EF4-FFF2-40B4-BE49-F238E27FC236}">
+                <a16:creationId xmlns:a16="http://schemas.microsoft.com/office/drawing/2014/main" id="{0AF48C89-2319-115E-2C20-FDF0316E570A}"/>
+              </a:ext>
+            </a:extLst>
+          </p:cNvPr>
+          <p:cNvPicPr>
+            <a:picLocks noChangeAspect="1"/>
+          </p:cNvPicPr>
+          <p:nvPr/>
+        </p:nvPicPr>
+        <p:blipFill rotWithShape="1">
+          <a:blip r:embed="rId2"/>
+          <a:srcRect l="1333"/>
+          <a:stretch/>
+        </p:blipFill>
+        <p:spPr>
+          <a:xfrm>
+            <a:off x="457199" y="439841"/>
+            <a:ext cx="11277600" cy="5943600"/>
+          </a:xfrm>
+          <a:prstGeom prst="rect">
+            <a:avLst/>
+          </a:prstGeom>
+        </p:spPr>
+      </p:pic>
+      <p:sp>
+        <p:nvSpPr>
+          <p:cNvPr id="6" name="TextBox 5">
+            <a:extLst>
+              <a:ext uri="{FF2B5EF4-FFF2-40B4-BE49-F238E27FC236}">
+                <a16:creationId xmlns:a16="http://schemas.microsoft.com/office/drawing/2014/main" id="{0836E033-C21E-85BB-D8A5-588CD2CBD1D8}"/>
+              </a:ext>
+            </a:extLst>
+          </p:cNvPr>
+          <p:cNvSpPr txBox="1"/>
+          <p:nvPr/>
+        </p:nvSpPr>
+        <p:spPr>
+          <a:xfrm>
+            <a:off x="909636" y="474559"/>
+            <a:ext cx="9560244" cy="584775"/>
+          </a:xfrm>
+          <a:prstGeom prst="rect">
+            <a:avLst/>
+          </a:prstGeom>
+          <a:noFill/>
+        </p:spPr>
+        <p:txBody>
+          <a:bodyPr wrap="square" rtlCol="0">
+            <a:spAutoFit/>
+          </a:bodyPr>
+          <a:lstStyle/>
+          <a:p>
+            <a:r>
+              <a:rPr lang="en-RO" sz="3200" dirty="0">
+                <a:solidFill>
+                  <a:schemeClr val="bg1"/>
+                </a:solidFill>
+              </a:rPr>
+              <a:t>7. Cum apelam o variabila pe un obiect (ne-static)?</a:t>
+            </a:r>
+          </a:p>
+        </p:txBody>
+      </p:sp>
+      <p:sp>
+        <p:nvSpPr>
+          <p:cNvPr id="2" name="TextBox 1">
+            <a:extLst>
+              <a:ext uri="{FF2B5EF4-FFF2-40B4-BE49-F238E27FC236}">
+                <a16:creationId xmlns:a16="http://schemas.microsoft.com/office/drawing/2014/main" id="{8D81FA32-8887-621B-1C81-531E93D47744}"/>
+              </a:ext>
+            </a:extLst>
+          </p:cNvPr>
+          <p:cNvSpPr txBox="1"/>
+          <p:nvPr/>
+        </p:nvSpPr>
+        <p:spPr>
+          <a:xfrm>
+            <a:off x="457199" y="1094052"/>
+            <a:ext cx="9875521" cy="1200329"/>
+          </a:xfrm>
+          <a:prstGeom prst="rect">
+            <a:avLst/>
+          </a:prstGeom>
+          <a:noFill/>
+        </p:spPr>
+        <p:txBody>
+          <a:bodyPr wrap="square" rtlCol="0">
+            <a:spAutoFit/>
+          </a:bodyPr>
+          <a:lstStyle/>
+          <a:p>
+            <a:pPr marL="285750" indent="-285750">
+              <a:buFont typeface="Arial" panose="020B0604020202020204" pitchFamily="34" charset="0"/>
+              <a:buChar char="•"/>
+            </a:pPr>
+            <a:r>
+              <a:rPr lang="en-GB" sz="1800" dirty="0" err="1">
+                <a:solidFill>
+                  <a:schemeClr val="bg1"/>
+                </a:solidFill>
+              </a:rPr>
+              <a:t>Pentru</a:t>
+            </a:r>
+            <a:r>
+              <a:rPr lang="en-GB" sz="1800" dirty="0">
+                <a:solidFill>
+                  <a:schemeClr val="bg1"/>
+                </a:solidFill>
+              </a:rPr>
+              <a:t> a </a:t>
+            </a:r>
+            <a:r>
+              <a:rPr lang="en-GB" sz="1800" dirty="0" err="1">
+                <a:solidFill>
+                  <a:schemeClr val="bg1"/>
+                </a:solidFill>
+              </a:rPr>
+              <a:t>accesa</a:t>
+            </a:r>
+            <a:r>
+              <a:rPr lang="en-GB" sz="1800" dirty="0">
+                <a:solidFill>
+                  <a:schemeClr val="bg1"/>
+                </a:solidFill>
+              </a:rPr>
+              <a:t> </a:t>
+            </a:r>
+            <a:r>
+              <a:rPr lang="en-GB" sz="1800" dirty="0" err="1">
+                <a:solidFill>
+                  <a:schemeClr val="bg1"/>
+                </a:solidFill>
+              </a:rPr>
+              <a:t>variabilele</a:t>
+            </a:r>
+            <a:r>
+              <a:rPr lang="en-GB" sz="1800" dirty="0">
+                <a:solidFill>
+                  <a:schemeClr val="bg1"/>
+                </a:solidFill>
+              </a:rPr>
+              <a:t> </a:t>
+            </a:r>
+            <a:r>
+              <a:rPr lang="en-GB" sz="1800" dirty="0" err="1">
+                <a:solidFill>
+                  <a:schemeClr val="bg1"/>
+                </a:solidFill>
+              </a:rPr>
+              <a:t>unui</a:t>
+            </a:r>
+            <a:r>
+              <a:rPr lang="en-GB" sz="1800" dirty="0">
+                <a:solidFill>
+                  <a:schemeClr val="bg1"/>
+                </a:solidFill>
+              </a:rPr>
+              <a:t> </a:t>
+            </a:r>
+            <a:r>
+              <a:rPr lang="en-GB" sz="1800" dirty="0" err="1">
+                <a:solidFill>
+                  <a:schemeClr val="bg1"/>
+                </a:solidFill>
+              </a:rPr>
+              <a:t>obiect</a:t>
+            </a:r>
+            <a:r>
+              <a:rPr lang="en-GB" sz="1800" dirty="0">
+                <a:solidFill>
+                  <a:schemeClr val="bg1"/>
+                </a:solidFill>
+              </a:rPr>
+              <a:t>, </a:t>
+            </a:r>
+            <a:r>
+              <a:rPr lang="en-GB" sz="1800" dirty="0" err="1">
+                <a:solidFill>
+                  <a:schemeClr val="bg1"/>
+                </a:solidFill>
+              </a:rPr>
+              <a:t>pur</a:t>
+            </a:r>
+            <a:r>
+              <a:rPr lang="en-GB" sz="1800" dirty="0">
+                <a:solidFill>
+                  <a:schemeClr val="bg1"/>
+                </a:solidFill>
+              </a:rPr>
+              <a:t> </a:t>
+            </a:r>
+            <a:r>
+              <a:rPr lang="en-GB" sz="1800" dirty="0" err="1">
+                <a:solidFill>
+                  <a:schemeClr val="bg1"/>
+                </a:solidFill>
+              </a:rPr>
+              <a:t>și</a:t>
+            </a:r>
+            <a:r>
+              <a:rPr lang="en-GB" sz="1800" dirty="0">
+                <a:solidFill>
+                  <a:schemeClr val="bg1"/>
+                </a:solidFill>
+              </a:rPr>
+              <a:t> </a:t>
+            </a:r>
+            <a:r>
+              <a:rPr lang="en-GB" sz="1800" dirty="0" err="1">
+                <a:solidFill>
+                  <a:schemeClr val="bg1"/>
+                </a:solidFill>
+              </a:rPr>
+              <a:t>simplu</a:t>
+            </a:r>
+            <a:r>
+              <a:rPr lang="en-GB" sz="1800" dirty="0">
+                <a:solidFill>
+                  <a:schemeClr val="bg1"/>
+                </a:solidFill>
+              </a:rPr>
+              <a:t> </a:t>
+            </a:r>
+            <a:r>
+              <a:rPr lang="en-GB" sz="1800" dirty="0" err="1">
+                <a:solidFill>
+                  <a:schemeClr val="bg1"/>
+                </a:solidFill>
+              </a:rPr>
+              <a:t>adăugați</a:t>
+            </a:r>
+            <a:r>
+              <a:rPr lang="en-GB" sz="1800" dirty="0">
+                <a:solidFill>
+                  <a:schemeClr val="bg1"/>
+                </a:solidFill>
+              </a:rPr>
+              <a:t> </a:t>
+            </a:r>
+            <a:r>
+              <a:rPr lang="en-GB" sz="1800" dirty="0" err="1">
+                <a:solidFill>
+                  <a:schemeClr val="bg1"/>
+                </a:solidFill>
+              </a:rPr>
+              <a:t>numele</a:t>
+            </a:r>
+            <a:r>
+              <a:rPr lang="en-GB" sz="1800" dirty="0">
+                <a:solidFill>
+                  <a:schemeClr val="bg1"/>
+                </a:solidFill>
+              </a:rPr>
+              <a:t> </a:t>
+            </a:r>
+            <a:r>
+              <a:rPr lang="en-GB" sz="1800" dirty="0" err="1">
+                <a:solidFill>
+                  <a:schemeClr val="bg1"/>
+                </a:solidFill>
+              </a:rPr>
+              <a:t>variabilei</a:t>
+            </a:r>
+            <a:r>
+              <a:rPr lang="en-GB" sz="1800" dirty="0">
+                <a:solidFill>
+                  <a:schemeClr val="bg1"/>
+                </a:solidFill>
+              </a:rPr>
+              <a:t> la o </a:t>
+            </a:r>
+            <a:r>
+              <a:rPr lang="en-GB" sz="1800" dirty="0" err="1">
+                <a:solidFill>
+                  <a:schemeClr val="bg1"/>
+                </a:solidFill>
+              </a:rPr>
+              <a:t>referință</a:t>
+            </a:r>
+            <a:r>
+              <a:rPr lang="en-GB" sz="1800" dirty="0">
+                <a:solidFill>
+                  <a:schemeClr val="bg1"/>
+                </a:solidFill>
+              </a:rPr>
+              <a:t> de </a:t>
+            </a:r>
+            <a:r>
+              <a:rPr lang="en-GB" sz="1800" dirty="0" err="1">
+                <a:solidFill>
+                  <a:schemeClr val="bg1"/>
+                </a:solidFill>
+              </a:rPr>
+              <a:t>obiect</a:t>
+            </a:r>
+            <a:r>
+              <a:rPr lang="en-GB" sz="1800" dirty="0">
+                <a:solidFill>
+                  <a:schemeClr val="bg1"/>
+                </a:solidFill>
+              </a:rPr>
+              <a:t> cu un „</a:t>
+            </a:r>
+            <a:r>
+              <a:rPr lang="en-GB" sz="1800" dirty="0" err="1">
+                <a:solidFill>
+                  <a:schemeClr val="bg1"/>
+                </a:solidFill>
+              </a:rPr>
+              <a:t>intervin</a:t>
+            </a:r>
+            <a:r>
+              <a:rPr lang="en-GB" sz="1800" dirty="0">
+                <a:solidFill>
+                  <a:schemeClr val="bg1"/>
+                </a:solidFill>
+              </a:rPr>
+              <a:t>”. ' (</a:t>
+            </a:r>
+            <a:r>
+              <a:rPr lang="en-GB" sz="1800" dirty="0" err="1">
+                <a:solidFill>
+                  <a:schemeClr val="bg1"/>
+                </a:solidFill>
+              </a:rPr>
+              <a:t>perioada</a:t>
+            </a:r>
+            <a:r>
+              <a:rPr lang="en-GB" sz="1800" dirty="0">
+                <a:solidFill>
+                  <a:schemeClr val="bg1"/>
+                </a:solidFill>
+              </a:rPr>
+              <a:t>).</a:t>
+            </a:r>
+          </a:p>
+          <a:p>
+            <a:pPr marL="285750" indent="-285750">
+              <a:buFont typeface="Arial" panose="020B0604020202020204" pitchFamily="34" charset="0"/>
+              <a:buChar char="•"/>
+            </a:pPr>
+            <a:r>
+              <a:rPr lang="en-GB" dirty="0">
+                <a:solidFill>
+                  <a:schemeClr val="bg1"/>
+                </a:solidFill>
+              </a:rPr>
+              <a:t>Dar </a:t>
+            </a:r>
+            <a:r>
+              <a:rPr lang="en-GB" dirty="0">
+                <a:solidFill>
+                  <a:srgbClr val="FF0000"/>
+                </a:solidFill>
+              </a:rPr>
+              <a:t>de </a:t>
+            </a:r>
+            <a:r>
+              <a:rPr lang="en-GB" dirty="0" err="1">
+                <a:solidFill>
+                  <a:srgbClr val="FF0000"/>
+                </a:solidFill>
+              </a:rPr>
+              <a:t>regula</a:t>
+            </a:r>
+            <a:r>
+              <a:rPr lang="en-GB" dirty="0">
+                <a:solidFill>
+                  <a:srgbClr val="FF0000"/>
+                </a:solidFill>
+              </a:rPr>
+              <a:t> </a:t>
+            </a:r>
+            <a:r>
+              <a:rPr lang="en-GB" dirty="0" err="1">
+                <a:solidFill>
+                  <a:schemeClr val="bg1"/>
+                </a:solidFill>
+              </a:rPr>
+              <a:t>apelam</a:t>
+            </a:r>
+            <a:r>
+              <a:rPr lang="en-GB" dirty="0">
+                <a:solidFill>
+                  <a:schemeClr val="bg1"/>
+                </a:solidFill>
+              </a:rPr>
+              <a:t> </a:t>
+            </a:r>
+            <a:r>
+              <a:rPr lang="en-GB" dirty="0" err="1">
+                <a:solidFill>
+                  <a:schemeClr val="bg1"/>
+                </a:solidFill>
+              </a:rPr>
+              <a:t>metode</a:t>
+            </a:r>
+            <a:r>
+              <a:rPr lang="en-GB" dirty="0">
+                <a:solidFill>
+                  <a:schemeClr val="bg1"/>
+                </a:solidFill>
+              </a:rPr>
+              <a:t> precum setter </a:t>
+            </a:r>
+            <a:r>
+              <a:rPr lang="en-GB" dirty="0" err="1">
+                <a:solidFill>
+                  <a:schemeClr val="bg1"/>
+                </a:solidFill>
+              </a:rPr>
+              <a:t>si</a:t>
+            </a:r>
+            <a:r>
+              <a:rPr lang="en-GB" dirty="0">
+                <a:solidFill>
+                  <a:schemeClr val="bg1"/>
+                </a:solidFill>
+              </a:rPr>
+              <a:t> getter care </a:t>
+            </a:r>
+            <a:r>
+              <a:rPr lang="en-GB" dirty="0" err="1">
+                <a:solidFill>
+                  <a:schemeClr val="bg1"/>
+                </a:solidFill>
+              </a:rPr>
+              <a:t>actioneaza</a:t>
+            </a:r>
+            <a:r>
+              <a:rPr lang="en-GB" dirty="0">
+                <a:solidFill>
+                  <a:schemeClr val="bg1"/>
+                </a:solidFill>
+              </a:rPr>
+              <a:t> </a:t>
+            </a:r>
+            <a:r>
+              <a:rPr lang="en-GB" dirty="0" err="1">
+                <a:solidFill>
+                  <a:schemeClr val="bg1"/>
+                </a:solidFill>
+              </a:rPr>
+              <a:t>asupa</a:t>
+            </a:r>
+            <a:r>
+              <a:rPr lang="en-GB" dirty="0">
+                <a:solidFill>
+                  <a:schemeClr val="bg1"/>
+                </a:solidFill>
+              </a:rPr>
+              <a:t> </a:t>
+            </a:r>
+            <a:r>
+              <a:rPr lang="en-GB" dirty="0" err="1">
+                <a:solidFill>
+                  <a:schemeClr val="bg1"/>
+                </a:solidFill>
+              </a:rPr>
+              <a:t>variabilelor</a:t>
+            </a:r>
+            <a:r>
+              <a:rPr lang="en-GB" dirty="0">
+                <a:solidFill>
+                  <a:schemeClr val="bg1"/>
+                </a:solidFill>
+              </a:rPr>
+              <a:t> </a:t>
+            </a:r>
+            <a:r>
+              <a:rPr lang="en-GB" dirty="0" err="1">
+                <a:solidFill>
+                  <a:schemeClr val="bg1"/>
+                </a:solidFill>
+              </a:rPr>
+              <a:t>si</a:t>
+            </a:r>
+            <a:r>
+              <a:rPr lang="en-GB" dirty="0">
+                <a:solidFill>
+                  <a:schemeClr val="bg1"/>
+                </a:solidFill>
+              </a:rPr>
+              <a:t> a </a:t>
+            </a:r>
+            <a:r>
+              <a:rPr lang="en-GB" dirty="0" err="1">
+                <a:solidFill>
+                  <a:schemeClr val="bg1"/>
+                </a:solidFill>
+              </a:rPr>
+              <a:t>obiectelor</a:t>
+            </a:r>
+            <a:r>
+              <a:rPr lang="en-GB" dirty="0">
+                <a:solidFill>
+                  <a:schemeClr val="bg1"/>
+                </a:solidFill>
+              </a:rPr>
+              <a:t>, </a:t>
+            </a:r>
+            <a:r>
+              <a:rPr lang="en-GB" dirty="0" err="1">
+                <a:solidFill>
+                  <a:schemeClr val="bg1"/>
+                </a:solidFill>
+              </a:rPr>
+              <a:t>deoarece</a:t>
+            </a:r>
+            <a:r>
+              <a:rPr lang="en-GB" dirty="0">
+                <a:solidFill>
+                  <a:schemeClr val="bg1"/>
+                </a:solidFill>
+              </a:rPr>
+              <a:t> </a:t>
+            </a:r>
+            <a:r>
+              <a:rPr lang="en-GB" dirty="0" err="1">
+                <a:solidFill>
+                  <a:schemeClr val="bg1"/>
+                </a:solidFill>
+              </a:rPr>
+              <a:t>acestea</a:t>
+            </a:r>
+            <a:r>
+              <a:rPr lang="en-GB" dirty="0">
+                <a:solidFill>
+                  <a:schemeClr val="bg1"/>
+                </a:solidFill>
+              </a:rPr>
+              <a:t> </a:t>
+            </a:r>
+            <a:r>
+              <a:rPr lang="en-GB" dirty="0" err="1">
+                <a:solidFill>
+                  <a:schemeClr val="bg1"/>
+                </a:solidFill>
+              </a:rPr>
+              <a:t>vor</a:t>
+            </a:r>
+            <a:r>
+              <a:rPr lang="en-GB" dirty="0">
+                <a:solidFill>
+                  <a:schemeClr val="bg1"/>
+                </a:solidFill>
+              </a:rPr>
+              <a:t> fi private</a:t>
+            </a:r>
+            <a:endParaRPr lang="en-RO" sz="1800" dirty="0">
+              <a:solidFill>
+                <a:schemeClr val="bg1"/>
+              </a:solidFill>
+            </a:endParaRPr>
+          </a:p>
+        </p:txBody>
+      </p:sp>
+      <p:pic>
+        <p:nvPicPr>
+          <p:cNvPr id="3" name="Picture 2">
+            <a:extLst>
+              <a:ext uri="{FF2B5EF4-FFF2-40B4-BE49-F238E27FC236}">
+                <a16:creationId xmlns:a16="http://schemas.microsoft.com/office/drawing/2014/main" id="{968A3F45-A5DD-0BE4-F4E5-726AAE37B17E}"/>
+              </a:ext>
+            </a:extLst>
+          </p:cNvPr>
+          <p:cNvPicPr>
+            <a:picLocks noChangeAspect="1"/>
+          </p:cNvPicPr>
+          <p:nvPr/>
+        </p:nvPicPr>
+        <p:blipFill>
+          <a:blip r:embed="rId3"/>
+          <a:stretch>
+            <a:fillRect/>
+          </a:stretch>
+        </p:blipFill>
+        <p:spPr>
+          <a:xfrm>
+            <a:off x="4102648" y="2506046"/>
+            <a:ext cx="5974005" cy="3620010"/>
+          </a:xfrm>
+          <a:prstGeom prst="rect">
+            <a:avLst/>
+          </a:prstGeom>
+        </p:spPr>
+      </p:pic>
+      <p:sp>
+        <p:nvSpPr>
+          <p:cNvPr id="5" name="TextBox 4">
+            <a:extLst>
+              <a:ext uri="{FF2B5EF4-FFF2-40B4-BE49-F238E27FC236}">
+                <a16:creationId xmlns:a16="http://schemas.microsoft.com/office/drawing/2014/main" id="{3B3856DB-47AE-0781-3768-EC289FAB45F7}"/>
+              </a:ext>
+            </a:extLst>
+          </p:cNvPr>
+          <p:cNvSpPr txBox="1"/>
+          <p:nvPr/>
+        </p:nvSpPr>
+        <p:spPr>
+          <a:xfrm>
+            <a:off x="1142638" y="3194595"/>
+            <a:ext cx="2412091" cy="923330"/>
+          </a:xfrm>
+          <a:prstGeom prst="rect">
+            <a:avLst/>
+          </a:prstGeom>
+          <a:noFill/>
+        </p:spPr>
+        <p:txBody>
+          <a:bodyPr wrap="square" rtlCol="0">
+            <a:spAutoFit/>
+          </a:bodyPr>
+          <a:lstStyle/>
+          <a:p>
+            <a:r>
+              <a:rPr lang="en-RO" dirty="0">
+                <a:solidFill>
+                  <a:srgbClr val="FF0000"/>
+                </a:solidFill>
+              </a:rPr>
+              <a:t>NERECOMANDAT!!</a:t>
+            </a:r>
+          </a:p>
+          <a:p>
+            <a:r>
+              <a:rPr lang="en-RO" dirty="0">
+                <a:solidFill>
+                  <a:srgbClr val="FF0000"/>
+                </a:solidFill>
+              </a:rPr>
+              <a:t>deoarece nu respecta principiul encapsularii</a:t>
+            </a:r>
+          </a:p>
+        </p:txBody>
+      </p:sp>
+    </p:spTree>
+    <p:extLst>
+      <p:ext uri="{BB962C8B-B14F-4D97-AF65-F5344CB8AC3E}">
+        <p14:creationId xmlns:p14="http://schemas.microsoft.com/office/powerpoint/2010/main" val="47347247"/>
+      </p:ext>
+    </p:extLst>
+  </p:cSld>
+  <p:clrMapOvr>
+    <a:masterClrMapping/>
+  </p:clrMapOvr>
+</p:sld>
+</file>
+
+<file path=ppt/slides/slide14.xml><?xml version="1.0" encoding="utf-8"?>
+<p:sld xmlns:a="http://schemas.openxmlformats.org/drawingml/2006/main" xmlns:r="http://schemas.openxmlformats.org/officeDocument/2006/relationships" xmlns:p="http://schemas.openxmlformats.org/presentationml/2006/main">
+  <p:cSld>
+    <p:spTree>
+      <p:nvGrpSpPr>
+        <p:cNvPr id="1" name=""/>
+        <p:cNvGrpSpPr/>
+        <p:nvPr/>
+      </p:nvGrpSpPr>
+      <p:grpSpPr>
+        <a:xfrm>
+          <a:off x="0" y="0"/>
+          <a:ext cx="0" cy="0"/>
+          <a:chOff x="0" y="0"/>
+          <a:chExt cx="0" cy="0"/>
+        </a:xfrm>
+      </p:grpSpPr>
+      <p:pic>
+        <p:nvPicPr>
+          <p:cNvPr id="4" name="Picture 3" descr="A black rectangular object with white lines&#10;&#10;Description automatically generated">
+            <a:extLst>
+              <a:ext uri="{FF2B5EF4-FFF2-40B4-BE49-F238E27FC236}">
+                <a16:creationId xmlns:a16="http://schemas.microsoft.com/office/drawing/2014/main" id="{0AF48C89-2319-115E-2C20-FDF0316E570A}"/>
+              </a:ext>
+            </a:extLst>
+          </p:cNvPr>
+          <p:cNvPicPr>
+            <a:picLocks noChangeAspect="1"/>
+          </p:cNvPicPr>
+          <p:nvPr/>
+        </p:nvPicPr>
+        <p:blipFill rotWithShape="1">
+          <a:blip r:embed="rId2"/>
+          <a:srcRect l="1333"/>
+          <a:stretch/>
+        </p:blipFill>
+        <p:spPr>
+          <a:xfrm>
+            <a:off x="457199" y="439841"/>
+            <a:ext cx="11277600" cy="5943600"/>
+          </a:xfrm>
+          <a:prstGeom prst="rect">
+            <a:avLst/>
+          </a:prstGeom>
+        </p:spPr>
+      </p:pic>
+      <p:sp>
+        <p:nvSpPr>
+          <p:cNvPr id="6" name="TextBox 5">
+            <a:extLst>
+              <a:ext uri="{FF2B5EF4-FFF2-40B4-BE49-F238E27FC236}">
+                <a16:creationId xmlns:a16="http://schemas.microsoft.com/office/drawing/2014/main" id="{0836E033-C21E-85BB-D8A5-588CD2CBD1D8}"/>
+              </a:ext>
+            </a:extLst>
+          </p:cNvPr>
+          <p:cNvSpPr txBox="1"/>
+          <p:nvPr/>
+        </p:nvSpPr>
+        <p:spPr>
+          <a:xfrm>
+            <a:off x="909636" y="474559"/>
+            <a:ext cx="9560244" cy="584775"/>
+          </a:xfrm>
+          <a:prstGeom prst="rect">
+            <a:avLst/>
+          </a:prstGeom>
+          <a:noFill/>
+        </p:spPr>
+        <p:txBody>
+          <a:bodyPr wrap="square" rtlCol="0">
+            <a:spAutoFit/>
+          </a:bodyPr>
+          <a:lstStyle/>
+          <a:p>
+            <a:r>
+              <a:rPr lang="en-RO" sz="3200" dirty="0">
+                <a:solidFill>
+                  <a:schemeClr val="bg1"/>
+                </a:solidFill>
+              </a:rPr>
+              <a:t>9. Cum o metoda statica?</a:t>
+            </a:r>
+          </a:p>
+        </p:txBody>
+      </p:sp>
+      <p:pic>
+        <p:nvPicPr>
+          <p:cNvPr id="3076" name="Picture 4" descr="Java Static Keyword: What It Is and How to Use It - BootcampToProd">
+            <a:extLst>
+              <a:ext uri="{FF2B5EF4-FFF2-40B4-BE49-F238E27FC236}">
+                <a16:creationId xmlns:a16="http://schemas.microsoft.com/office/drawing/2014/main" id="{75E9C10E-3C0E-A582-BD53-850BA0C37608}"/>
+              </a:ext>
+            </a:extLst>
+          </p:cNvPr>
+          <p:cNvPicPr>
+            <a:picLocks noChangeAspect="1" noChangeArrowheads="1"/>
+          </p:cNvPicPr>
+          <p:nvPr/>
+        </p:nvPicPr>
+        <p:blipFill>
+          <a:blip r:embed="rId3">
+            <a:extLst>
+              <a:ext uri="{28A0092B-C50C-407E-A947-70E740481C1C}">
+                <a14:useLocalDpi xmlns:a14="http://schemas.microsoft.com/office/drawing/2010/main" val="0"/>
+              </a:ext>
+            </a:extLst>
+          </a:blip>
+          <a:srcRect/>
+          <a:stretch>
+            <a:fillRect/>
+          </a:stretch>
+        </p:blipFill>
+        <p:spPr bwMode="auto">
+          <a:xfrm>
+            <a:off x="6240780" y="2093317"/>
+            <a:ext cx="5087929" cy="4065826"/>
+          </a:xfrm>
+          <a:prstGeom prst="rect">
+            <a:avLst/>
+          </a:prstGeom>
+          <a:noFill/>
+          <a:extLst>
+            <a:ext uri="{909E8E84-426E-40DD-AFC4-6F175D3DCCD1}">
+              <a14:hiddenFill xmlns:a14="http://schemas.microsoft.com/office/drawing/2010/main">
+                <a:solidFill>
+                  <a:srgbClr val="FFFFFF"/>
+                </a:solidFill>
+              </a14:hiddenFill>
+            </a:ext>
+          </a:extLst>
+        </p:spPr>
+      </p:pic>
+      <p:sp>
+        <p:nvSpPr>
+          <p:cNvPr id="9" name="TextBox 8">
+            <a:extLst>
+              <a:ext uri="{FF2B5EF4-FFF2-40B4-BE49-F238E27FC236}">
+                <a16:creationId xmlns:a16="http://schemas.microsoft.com/office/drawing/2014/main" id="{7942D3F2-4339-E340-1EB4-B3F1D5AA73DD}"/>
+              </a:ext>
+            </a:extLst>
+          </p:cNvPr>
+          <p:cNvSpPr txBox="1"/>
+          <p:nvPr/>
+        </p:nvSpPr>
+        <p:spPr>
+          <a:xfrm>
+            <a:off x="662940" y="1113256"/>
+            <a:ext cx="5026818" cy="1200329"/>
+          </a:xfrm>
+          <a:prstGeom prst="rect">
+            <a:avLst/>
+          </a:prstGeom>
+          <a:noFill/>
+        </p:spPr>
+        <p:txBody>
+          <a:bodyPr wrap="square" rtlCol="0">
+            <a:spAutoFit/>
+          </a:bodyPr>
+          <a:lstStyle/>
+          <a:p>
+            <a:pPr marL="285750" indent="-285750">
+              <a:buFont typeface="Arial" panose="020B0604020202020204" pitchFamily="34" charset="0"/>
+              <a:buChar char="•"/>
+            </a:pPr>
+            <a:r>
+              <a:rPr lang="en-RO" dirty="0">
+                <a:solidFill>
+                  <a:schemeClr val="bg1"/>
+                </a:solidFill>
+              </a:rPr>
+              <a:t>Cand stim ca metoda pe care o cream nu actioneaza asupra unor variabile instanta putem pune cuvantul cheie static la metdoele create</a:t>
+            </a:r>
+          </a:p>
+        </p:txBody>
+      </p:sp>
+      <p:pic>
+        <p:nvPicPr>
+          <p:cNvPr id="2" name="Picture 1">
+            <a:extLst>
+              <a:ext uri="{FF2B5EF4-FFF2-40B4-BE49-F238E27FC236}">
+                <a16:creationId xmlns:a16="http://schemas.microsoft.com/office/drawing/2014/main" id="{10DE6C1C-7BFC-74E7-A909-BB40BBE6DE5B}"/>
+              </a:ext>
+            </a:extLst>
+          </p:cNvPr>
+          <p:cNvPicPr>
+            <a:picLocks noChangeAspect="1"/>
+          </p:cNvPicPr>
+          <p:nvPr/>
+        </p:nvPicPr>
+        <p:blipFill>
+          <a:blip r:embed="rId4"/>
+          <a:stretch>
+            <a:fillRect/>
+          </a:stretch>
+        </p:blipFill>
+        <p:spPr>
+          <a:xfrm>
+            <a:off x="662940" y="2560926"/>
+            <a:ext cx="5223282" cy="2639723"/>
+          </a:xfrm>
+          <a:prstGeom prst="rect">
+            <a:avLst/>
+          </a:prstGeom>
+        </p:spPr>
+      </p:pic>
+    </p:spTree>
+    <p:extLst>
+      <p:ext uri="{BB962C8B-B14F-4D97-AF65-F5344CB8AC3E}">
+        <p14:creationId xmlns:p14="http://schemas.microsoft.com/office/powerpoint/2010/main" val="1158629266"/>
+      </p:ext>
+    </p:extLst>
+  </p:cSld>
+  <p:clrMapOvr>
+    <a:masterClrMapping/>
+  </p:clrMapOvr>
+</p:sld>
+</file>
+
+<file path=ppt/slides/slide15.xml><?xml version="1.0" encoding="utf-8"?>
+<p:sld xmlns:a="http://schemas.openxmlformats.org/drawingml/2006/main" xmlns:r="http://schemas.openxmlformats.org/officeDocument/2006/relationships" xmlns:p="http://schemas.openxmlformats.org/presentationml/2006/main">
+  <p:cSld>
+    <p:spTree>
+      <p:nvGrpSpPr>
+        <p:cNvPr id="1" name=""/>
+        <p:cNvGrpSpPr/>
+        <p:nvPr/>
+      </p:nvGrpSpPr>
+      <p:grpSpPr>
+        <a:xfrm>
+          <a:off x="0" y="0"/>
+          <a:ext cx="0" cy="0"/>
+          <a:chOff x="0" y="0"/>
+          <a:chExt cx="0" cy="0"/>
+        </a:xfrm>
+      </p:grpSpPr>
+      <p:pic>
+        <p:nvPicPr>
+          <p:cNvPr id="4" name="Picture 3" descr="A black rectangular object with white lines&#10;&#10;Description automatically generated">
+            <a:extLst>
+              <a:ext uri="{FF2B5EF4-FFF2-40B4-BE49-F238E27FC236}">
+                <a16:creationId xmlns:a16="http://schemas.microsoft.com/office/drawing/2014/main" id="{0AF48C89-2319-115E-2C20-FDF0316E570A}"/>
+              </a:ext>
+            </a:extLst>
+          </p:cNvPr>
+          <p:cNvPicPr>
+            <a:picLocks noChangeAspect="1"/>
+          </p:cNvPicPr>
+          <p:nvPr/>
+        </p:nvPicPr>
+        <p:blipFill rotWithShape="1">
+          <a:blip r:embed="rId2"/>
+          <a:srcRect l="1333"/>
+          <a:stretch/>
+        </p:blipFill>
+        <p:spPr>
+          <a:xfrm>
+            <a:off x="457199" y="439841"/>
+            <a:ext cx="11277600" cy="5943600"/>
+          </a:xfrm>
+          <a:prstGeom prst="rect">
+            <a:avLst/>
+          </a:prstGeom>
+        </p:spPr>
+      </p:pic>
+      <p:sp>
+        <p:nvSpPr>
+          <p:cNvPr id="6" name="TextBox 5">
+            <a:extLst>
+              <a:ext uri="{FF2B5EF4-FFF2-40B4-BE49-F238E27FC236}">
+                <a16:creationId xmlns:a16="http://schemas.microsoft.com/office/drawing/2014/main" id="{0836E033-C21E-85BB-D8A5-588CD2CBD1D8}"/>
+              </a:ext>
+            </a:extLst>
+          </p:cNvPr>
+          <p:cNvSpPr txBox="1"/>
+          <p:nvPr/>
+        </p:nvSpPr>
+        <p:spPr>
+          <a:xfrm>
+            <a:off x="909636" y="474559"/>
+            <a:ext cx="9560244" cy="584775"/>
+          </a:xfrm>
+          <a:prstGeom prst="rect">
+            <a:avLst/>
+          </a:prstGeom>
+          <a:noFill/>
+        </p:spPr>
+        <p:txBody>
+          <a:bodyPr wrap="square" rtlCol="0">
+            <a:spAutoFit/>
+          </a:bodyPr>
+          <a:lstStyle/>
+          <a:p>
+            <a:r>
+              <a:rPr lang="en-RO" sz="3200" dirty="0">
+                <a:solidFill>
+                  <a:schemeClr val="bg1"/>
+                </a:solidFill>
+              </a:rPr>
+              <a:t>8. Cum apelam o variabila sau obiect static?</a:t>
+            </a:r>
+          </a:p>
+        </p:txBody>
+      </p:sp>
+      <p:pic>
+        <p:nvPicPr>
+          <p:cNvPr id="3076" name="Picture 4" descr="Java Static Keyword: What It Is and How to Use It - BootcampToProd">
+            <a:extLst>
+              <a:ext uri="{FF2B5EF4-FFF2-40B4-BE49-F238E27FC236}">
+                <a16:creationId xmlns:a16="http://schemas.microsoft.com/office/drawing/2014/main" id="{75E9C10E-3C0E-A582-BD53-850BA0C37608}"/>
+              </a:ext>
+            </a:extLst>
+          </p:cNvPr>
+          <p:cNvPicPr>
+            <a:picLocks noChangeAspect="1" noChangeArrowheads="1"/>
+          </p:cNvPicPr>
+          <p:nvPr/>
+        </p:nvPicPr>
+        <p:blipFill>
+          <a:blip r:embed="rId3">
+            <a:extLst>
+              <a:ext uri="{28A0092B-C50C-407E-A947-70E740481C1C}">
+                <a14:useLocalDpi xmlns:a14="http://schemas.microsoft.com/office/drawing/2010/main" val="0"/>
+              </a:ext>
+            </a:extLst>
+          </a:blip>
+          <a:srcRect/>
+          <a:stretch>
+            <a:fillRect/>
+          </a:stretch>
+        </p:blipFill>
+        <p:spPr bwMode="auto">
+          <a:xfrm>
+            <a:off x="6240780" y="2093317"/>
+            <a:ext cx="5087929" cy="4065826"/>
+          </a:xfrm>
+          <a:prstGeom prst="rect">
+            <a:avLst/>
+          </a:prstGeom>
+          <a:noFill/>
+          <a:extLst>
+            <a:ext uri="{909E8E84-426E-40DD-AFC4-6F175D3DCCD1}">
+              <a14:hiddenFill xmlns:a14="http://schemas.microsoft.com/office/drawing/2010/main">
+                <a:solidFill>
+                  <a:srgbClr val="FFFFFF"/>
+                </a:solidFill>
+              </a14:hiddenFill>
+            </a:ext>
+          </a:extLst>
+        </p:spPr>
+      </p:pic>
+      <p:sp>
+        <p:nvSpPr>
+          <p:cNvPr id="7" name="TextBox 6">
+            <a:extLst>
+              <a:ext uri="{FF2B5EF4-FFF2-40B4-BE49-F238E27FC236}">
+                <a16:creationId xmlns:a16="http://schemas.microsoft.com/office/drawing/2014/main" id="{ED089931-59C8-E009-E872-1FFB6A6519AF}"/>
+              </a:ext>
+            </a:extLst>
+          </p:cNvPr>
+          <p:cNvSpPr txBox="1"/>
+          <p:nvPr/>
+        </p:nvSpPr>
+        <p:spPr>
+          <a:xfrm>
+            <a:off x="6624636" y="1111432"/>
+            <a:ext cx="4016694" cy="923330"/>
+          </a:xfrm>
+          <a:prstGeom prst="rect">
+            <a:avLst/>
+          </a:prstGeom>
+          <a:noFill/>
+        </p:spPr>
+        <p:txBody>
+          <a:bodyPr wrap="square" rtlCol="0">
+            <a:spAutoFit/>
+          </a:bodyPr>
+          <a:lstStyle/>
+          <a:p>
+            <a:r>
+              <a:rPr lang="en-RO" dirty="0">
+                <a:solidFill>
+                  <a:schemeClr val="bg1"/>
+                </a:solidFill>
+              </a:rPr>
+              <a:t>Cuvantul cheie static se poate asocia cu cuvantul cheie “final” pentru a crea constante</a:t>
+            </a:r>
+          </a:p>
+        </p:txBody>
+      </p:sp>
+      <p:pic>
+        <p:nvPicPr>
+          <p:cNvPr id="8" name="Picture 7">
+            <a:extLst>
+              <a:ext uri="{FF2B5EF4-FFF2-40B4-BE49-F238E27FC236}">
+                <a16:creationId xmlns:a16="http://schemas.microsoft.com/office/drawing/2014/main" id="{5D5084CD-A043-1C9A-D03A-F926506824D8}"/>
+              </a:ext>
+            </a:extLst>
+          </p:cNvPr>
+          <p:cNvPicPr>
+            <a:picLocks noChangeAspect="1"/>
+          </p:cNvPicPr>
+          <p:nvPr/>
+        </p:nvPicPr>
+        <p:blipFill>
+          <a:blip r:embed="rId4"/>
+          <a:stretch>
+            <a:fillRect/>
+          </a:stretch>
+        </p:blipFill>
+        <p:spPr>
+          <a:xfrm>
+            <a:off x="538853" y="2506374"/>
+            <a:ext cx="5620273" cy="3239711"/>
+          </a:xfrm>
+          <a:prstGeom prst="rect">
+            <a:avLst/>
+          </a:prstGeom>
+        </p:spPr>
+      </p:pic>
+      <p:sp>
+        <p:nvSpPr>
+          <p:cNvPr id="9" name="TextBox 8">
+            <a:extLst>
+              <a:ext uri="{FF2B5EF4-FFF2-40B4-BE49-F238E27FC236}">
+                <a16:creationId xmlns:a16="http://schemas.microsoft.com/office/drawing/2014/main" id="{7942D3F2-4339-E340-1EB4-B3F1D5AA73DD}"/>
+              </a:ext>
+            </a:extLst>
+          </p:cNvPr>
+          <p:cNvSpPr txBox="1"/>
+          <p:nvPr/>
+        </p:nvSpPr>
+        <p:spPr>
+          <a:xfrm>
+            <a:off x="662940" y="1029046"/>
+            <a:ext cx="5026818" cy="1477328"/>
+          </a:xfrm>
+          <a:prstGeom prst="rect">
+            <a:avLst/>
+          </a:prstGeom>
+          <a:noFill/>
+        </p:spPr>
+        <p:txBody>
+          <a:bodyPr wrap="square" rtlCol="0">
+            <a:spAutoFit/>
+          </a:bodyPr>
+          <a:lstStyle/>
+          <a:p>
+            <a:pPr marL="285750" indent="-285750">
+              <a:buFont typeface="Arial" panose="020B0604020202020204" pitchFamily="34" charset="0"/>
+              <a:buChar char="•"/>
+            </a:pPr>
+            <a:r>
+              <a:rPr lang="en-RO" dirty="0">
+                <a:solidFill>
+                  <a:schemeClr val="bg1"/>
+                </a:solidFill>
+              </a:rPr>
+              <a:t>Apelam o variabila sau un obiect direct pe clasa cand acesta are cuvantul cheie static (static int count)</a:t>
+            </a:r>
+          </a:p>
+          <a:p>
+            <a:pPr marL="285750" indent="-285750">
+              <a:buFont typeface="Arial" panose="020B0604020202020204" pitchFamily="34" charset="0"/>
+              <a:buChar char="•"/>
+            </a:pPr>
+            <a:r>
+              <a:rPr lang="en-RO" dirty="0">
+                <a:solidFill>
+                  <a:schemeClr val="bg1"/>
+                </a:solidFill>
+              </a:rPr>
+              <a:t> Instantele nu sunt necesare daca apelam in context static.</a:t>
+            </a:r>
+          </a:p>
+        </p:txBody>
+      </p:sp>
+    </p:spTree>
+    <p:extLst>
+      <p:ext uri="{BB962C8B-B14F-4D97-AF65-F5344CB8AC3E}">
+        <p14:creationId xmlns:p14="http://schemas.microsoft.com/office/powerpoint/2010/main" val="2819867138"/>
       </p:ext>
     </p:extLst>
   </p:cSld>
@@ -12584,8 +14804,8 @@
         </p:nvSpPr>
         <p:spPr>
           <a:xfrm>
-            <a:off x="-415580" y="956463"/>
-            <a:ext cx="5961598" cy="4945063"/>
+            <a:off x="-511115" y="835025"/>
+            <a:ext cx="5940365" cy="5760085"/>
           </a:xfrm>
           <a:prstGeom prst="rect">
             <a:avLst/>
@@ -12593,7 +14813,7 @@
         </p:spPr>
         <p:txBody>
           <a:bodyPr vert="horz" lIns="91440" tIns="45720" rIns="91440" bIns="45720" rtlCol="0">
-            <a:normAutofit/>
+            <a:normAutofit fontScale="92500" lnSpcReduction="10000"/>
           </a:bodyPr>
           <a:lstStyle>
             <a:lvl1pPr algn="ctr" defTabSz="914400" rtl="0" eaLnBrk="1" latinLnBrk="0" hangingPunct="1">
@@ -12840,60 +15060,20 @@
               <a:buAutoNum type="arabicPeriod"/>
             </a:pPr>
             <a:r>
+              <a:rPr lang="en-US" sz="2800" dirty="0" err="1">
+                <a:latin typeface="+mn-lt"/>
+                <a:ea typeface="+mn-ea"/>
+                <a:cs typeface="+mn-cs"/>
+              </a:rPr>
+              <a:t>Operatorul</a:t>
+            </a:r>
+            <a:r>
               <a:rPr lang="en-US" sz="2800" dirty="0">
                 <a:latin typeface="+mn-lt"/>
                 <a:ea typeface="+mn-ea"/>
                 <a:cs typeface="+mn-cs"/>
               </a:rPr>
-              <a:t>Cum </a:t>
-            </a:r>
-            <a:r>
-              <a:rPr lang="en-US" sz="2800" dirty="0" err="1">
-                <a:latin typeface="+mn-lt"/>
-                <a:ea typeface="+mn-ea"/>
-                <a:cs typeface="+mn-cs"/>
-              </a:rPr>
-              <a:t>apelam</a:t>
-            </a:r>
-            <a:r>
-              <a:rPr lang="en-US" sz="2800" dirty="0">
-                <a:latin typeface="+mn-lt"/>
-                <a:ea typeface="+mn-ea"/>
-                <a:cs typeface="+mn-cs"/>
-              </a:rPr>
-              <a:t> o </a:t>
-            </a:r>
-            <a:r>
-              <a:rPr lang="en-US" sz="2800" dirty="0" err="1">
-                <a:latin typeface="+mn-lt"/>
-                <a:ea typeface="+mn-ea"/>
-                <a:cs typeface="+mn-cs"/>
-              </a:rPr>
-              <a:t>metoda</a:t>
-            </a:r>
-            <a:r>
-              <a:rPr lang="en-US" sz="2800" dirty="0">
-                <a:latin typeface="+mn-lt"/>
-                <a:ea typeface="+mn-ea"/>
-                <a:cs typeface="+mn-cs"/>
-              </a:rPr>
-              <a:t> pe un </a:t>
-            </a:r>
-            <a:r>
-              <a:rPr lang="en-US" sz="2800" dirty="0" err="1">
-                <a:latin typeface="+mn-lt"/>
-                <a:ea typeface="+mn-ea"/>
-                <a:cs typeface="+mn-cs"/>
-              </a:rPr>
-              <a:t>obiect</a:t>
-            </a:r>
-            <a:r>
-              <a:rPr lang="en-US" sz="2800" dirty="0">
-                <a:latin typeface="+mn-lt"/>
-                <a:ea typeface="+mn-ea"/>
-                <a:cs typeface="+mn-cs"/>
-              </a:rPr>
-              <a:t>?</a:t>
+              <a:t> this</a:t>
             </a:r>
           </a:p>
           <a:p>
@@ -12934,7 +15114,7 @@
                 <a:ea typeface="+mn-ea"/>
                 <a:cs typeface="+mn-cs"/>
               </a:rPr>
-              <a:t>variabila</a:t>
+              <a:t>metoda</a:t>
             </a:r>
             <a:r>
               <a:rPr lang="en-US" sz="2800" dirty="0">
@@ -12942,7 +15122,7 @@
                 <a:ea typeface="+mn-ea"/>
                 <a:cs typeface="+mn-cs"/>
               </a:rPr>
-              <a:t> </a:t>
+              <a:t> pe un </a:t>
             </a:r>
             <a:r>
               <a:rPr lang="en-US" sz="2800" dirty="0" err="1">
@@ -12950,7 +15130,7 @@
                 <a:ea typeface="+mn-ea"/>
                 <a:cs typeface="+mn-cs"/>
               </a:rPr>
-              <a:t>statica</a:t>
+              <a:t>obiect</a:t>
             </a:r>
             <a:r>
               <a:rPr lang="en-US" sz="2800" dirty="0">
@@ -12958,7 +15138,137 @@
                 <a:ea typeface="+mn-ea"/>
                 <a:cs typeface="+mn-cs"/>
               </a:rPr>
-              <a:t>?</a:t>
+              <a:t> (context ne-static)?</a:t>
+            </a:r>
+          </a:p>
+          <a:p>
+            <a:pPr marL="1200150" indent="-514350" algn="l">
+              <a:spcAft>
+                <a:spcPts val="600"/>
+              </a:spcAft>
+              <a:buFont typeface="+mj-lt"/>
+              <a:buAutoNum type="arabicPeriod"/>
+            </a:pPr>
+            <a:r>
+              <a:rPr lang="en-US" sz="2800" dirty="0">
+                <a:latin typeface="+mn-lt"/>
+                <a:ea typeface="+mn-ea"/>
+                <a:cs typeface="+mn-cs"/>
+              </a:rPr>
+              <a:t>Cum </a:t>
+            </a:r>
+            <a:r>
+              <a:rPr lang="en-US" sz="2800" dirty="0" err="1">
+                <a:latin typeface="+mn-lt"/>
+                <a:ea typeface="+mn-ea"/>
+                <a:cs typeface="+mn-cs"/>
+              </a:rPr>
+              <a:t>apelam</a:t>
+            </a:r>
+            <a:r>
+              <a:rPr lang="en-US" sz="2800" dirty="0">
+                <a:latin typeface="+mn-lt"/>
+                <a:ea typeface="+mn-ea"/>
+                <a:cs typeface="+mn-cs"/>
+              </a:rPr>
+              <a:t> o </a:t>
+            </a:r>
+            <a:r>
+              <a:rPr lang="en-US" sz="2800" dirty="0" err="1">
+                <a:latin typeface="+mn-lt"/>
+                <a:ea typeface="+mn-ea"/>
+                <a:cs typeface="+mn-cs"/>
+              </a:rPr>
+              <a:t>variabila</a:t>
+            </a:r>
+            <a:r>
+              <a:rPr lang="en-US" sz="2800" dirty="0">
+                <a:latin typeface="+mn-lt"/>
+                <a:ea typeface="+mn-ea"/>
+                <a:cs typeface="+mn-cs"/>
+              </a:rPr>
+              <a:t> </a:t>
+            </a:r>
+            <a:r>
+              <a:rPr lang="en-US" sz="2800" dirty="0" err="1">
+                <a:latin typeface="+mn-lt"/>
+                <a:ea typeface="+mn-ea"/>
+                <a:cs typeface="+mn-cs"/>
+              </a:rPr>
+              <a:t>sau</a:t>
+            </a:r>
+            <a:r>
+              <a:rPr lang="en-US" sz="2800" dirty="0">
+                <a:latin typeface="+mn-lt"/>
+                <a:ea typeface="+mn-ea"/>
+                <a:cs typeface="+mn-cs"/>
+              </a:rPr>
+              <a:t> un </a:t>
+            </a:r>
+            <a:r>
+              <a:rPr lang="en-US" sz="2800" dirty="0" err="1">
+                <a:latin typeface="+mn-lt"/>
+                <a:ea typeface="+mn-ea"/>
+                <a:cs typeface="+mn-cs"/>
+              </a:rPr>
+              <a:t>obiect</a:t>
+            </a:r>
+            <a:r>
+              <a:rPr lang="en-US" sz="2800" dirty="0">
+                <a:latin typeface="+mn-lt"/>
+                <a:ea typeface="+mn-ea"/>
+                <a:cs typeface="+mn-cs"/>
+              </a:rPr>
+              <a:t> (context ne-static)</a:t>
+            </a:r>
+          </a:p>
+          <a:p>
+            <a:pPr marL="1200150" indent="-514350" algn="l">
+              <a:spcAft>
+                <a:spcPts val="600"/>
+              </a:spcAft>
+              <a:buFont typeface="+mj-lt"/>
+              <a:buAutoNum type="arabicPeriod"/>
+            </a:pPr>
+            <a:r>
+              <a:rPr lang="en-US" sz="2800" dirty="0">
+                <a:latin typeface="+mn-lt"/>
+                <a:ea typeface="+mn-ea"/>
+                <a:cs typeface="+mn-cs"/>
+              </a:rPr>
+              <a:t>Cum </a:t>
+            </a:r>
+            <a:r>
+              <a:rPr lang="en-US" sz="2800" dirty="0" err="1">
+                <a:latin typeface="+mn-lt"/>
+                <a:ea typeface="+mn-ea"/>
+                <a:cs typeface="+mn-cs"/>
+              </a:rPr>
+              <a:t>apelam</a:t>
+            </a:r>
+            <a:r>
+              <a:rPr lang="en-US" sz="2800" dirty="0">
+                <a:latin typeface="+mn-lt"/>
+                <a:ea typeface="+mn-ea"/>
+                <a:cs typeface="+mn-cs"/>
+              </a:rPr>
+              <a:t> o </a:t>
+            </a:r>
+            <a:r>
+              <a:rPr lang="en-US" sz="2800" dirty="0" err="1">
+                <a:latin typeface="+mn-lt"/>
+                <a:ea typeface="+mn-ea"/>
+                <a:cs typeface="+mn-cs"/>
+              </a:rPr>
+              <a:t>metoda</a:t>
+            </a:r>
+            <a:r>
+              <a:rPr lang="en-US" sz="2800" dirty="0">
+                <a:latin typeface="+mn-lt"/>
+                <a:ea typeface="+mn-ea"/>
+                <a:cs typeface="+mn-cs"/>
+              </a:rPr>
+              <a:t> in context static?</a:t>
             </a:r>
           </a:p>
           <a:p>
@@ -13087,7 +15397,7 @@
         </p:blipFill>
         <p:spPr bwMode="auto">
           <a:xfrm>
-            <a:off x="5354722" y="1257292"/>
+            <a:off x="5333770" y="956463"/>
             <a:ext cx="6637869" cy="3733802"/>
           </a:xfrm>
           <a:prstGeom prst="rect">
@@ -14023,7 +16333,7 @@
                   <a:schemeClr val="bg1"/>
                 </a:solidFill>
               </a:rPr>
-              <a:t>2. Ce sunt obiectele?</a:t>
+              <a:t>3. Ce sunt obiectele?</a:t>
             </a:r>
           </a:p>
         </p:txBody>
@@ -14211,7 +16521,7 @@
                   <a:schemeClr val="bg1"/>
                 </a:solidFill>
               </a:rPr>
-              <a:t>3.1. Cum instantiem o clasa? Cum cream un obiect?</a:t>
+              <a:t>4.1. Cum instantiem o clasa? Cum cream un obiect?</a:t>
             </a:r>
           </a:p>
         </p:txBody>
@@ -14471,7 +16781,7 @@
                   <a:schemeClr val="bg1"/>
                 </a:solidFill>
               </a:rPr>
-              <a:t>3.2. Ce este un constructor?</a:t>
+              <a:t>4.2. Ce este un constructor?</a:t>
             </a:r>
           </a:p>
         </p:txBody>
@@ -14616,7 +16926,7 @@
                   <a:schemeClr val="bg1"/>
                 </a:solidFill>
               </a:rPr>
-              <a:t>3.3. Ce este un constructor?</a:t>
+              <a:t>4.3. Ce este un constructor?</a:t>
             </a:r>
           </a:p>
         </p:txBody>

</xml_diff>